<commit_message>
PPT slides updated with ones sent to Sewoong
</commit_message>
<xml_diff>
--- a/PPT/Adaptive Crowdsourcing via EM with Prior.pptx
+++ b/PPT/Adaptive Crowdsourcing via EM with Prior.pptx
@@ -11,8 +11,13 @@
     <p:sldId id="261" r:id="rId5"/>
     <p:sldId id="262" r:id="rId6"/>
     <p:sldId id="263" r:id="rId7"/>
-    <p:sldId id="258" r:id="rId8"/>
-    <p:sldId id="264" r:id="rId9"/>
+    <p:sldId id="267" r:id="rId8"/>
+    <p:sldId id="265" r:id="rId9"/>
+    <p:sldId id="266" r:id="rId10"/>
+    <p:sldId id="264" r:id="rId11"/>
+    <p:sldId id="268" r:id="rId12"/>
+    <p:sldId id="270" r:id="rId13"/>
+    <p:sldId id="269" r:id="rId14"/>
   </p:sldIdLst>
   <p:sldSz cx="12192000" cy="6858000"/>
   <p:notesSz cx="6858000" cy="9144000"/>
@@ -3055,6 +3060,462 @@
 </p:sld>
 </file>
 
+<file path=ppt/slides/slide10.xml><?xml version="1.0" encoding="utf-8"?>
+<p:sld xmlns:a="http://schemas.openxmlformats.org/drawingml/2006/main" xmlns:r="http://schemas.openxmlformats.org/officeDocument/2006/relationships" xmlns:p="http://schemas.openxmlformats.org/presentationml/2006/main">
+  <p:cSld>
+    <p:spTree>
+      <p:nvGrpSpPr>
+        <p:cNvPr id="1" name=""/>
+        <p:cNvGrpSpPr/>
+        <p:nvPr/>
+      </p:nvGrpSpPr>
+      <p:grpSpPr>
+        <a:xfrm>
+          <a:off x="0" y="0"/>
+          <a:ext cx="0" cy="0"/>
+          <a:chOff x="0" y="0"/>
+          <a:chExt cx="0" cy="0"/>
+        </a:xfrm>
+      </p:grpSpPr>
+      <p:pic>
+        <p:nvPicPr>
+          <p:cNvPr id="3" name="Picture 2"/>
+          <p:cNvPicPr>
+            <a:picLocks noChangeAspect="1"/>
+          </p:cNvPicPr>
+          <p:nvPr/>
+        </p:nvPicPr>
+        <p:blipFill>
+          <a:blip r:embed="rId2">
+            <a:extLst>
+              <a:ext uri="{28A0092B-C50C-407E-A947-70E740481C1C}">
+                <a14:useLocalDpi xmlns:a14="http://schemas.microsoft.com/office/drawing/2010/main" val="0"/>
+              </a:ext>
+            </a:extLst>
+          </a:blip>
+          <a:stretch>
+            <a:fillRect/>
+          </a:stretch>
+        </p:blipFill>
+        <p:spPr>
+          <a:xfrm>
+            <a:off x="558800" y="432113"/>
+            <a:ext cx="11161655" cy="5396107"/>
+          </a:xfrm>
+          <a:prstGeom prst="rect">
+            <a:avLst/>
+          </a:prstGeom>
+        </p:spPr>
+      </p:pic>
+      <p:sp>
+        <p:nvSpPr>
+          <p:cNvPr id="8" name="TextBox 7"/>
+          <p:cNvSpPr txBox="1"/>
+          <p:nvPr/>
+        </p:nvSpPr>
+        <p:spPr>
+          <a:xfrm>
+            <a:off x="558800" y="6055124"/>
+            <a:ext cx="10708640" cy="646331"/>
+          </a:xfrm>
+          <a:prstGeom prst="rect">
+            <a:avLst/>
+          </a:prstGeom>
+          <a:noFill/>
+        </p:spPr>
+        <p:txBody>
+          <a:bodyPr wrap="square" rtlCol="0">
+            <a:spAutoFit/>
+          </a:bodyPr>
+          <a:lstStyle/>
+          <a:p>
+            <a:r>
+              <a:rPr lang="en-US" dirty="0" smtClean="0"/>
+              <a:t>Image: Choi</a:t>
+            </a:r>
+            <a:r>
+              <a:rPr lang="en-US" dirty="0"/>
+              <a:t>, </a:t>
+            </a:r>
+            <a:r>
+              <a:rPr lang="en-US" dirty="0" err="1"/>
+              <a:t>Junyeong</a:t>
+            </a:r>
+            <a:r>
+              <a:rPr lang="en-US" dirty="0"/>
+              <a:t>, et al. "</a:t>
+            </a:r>
+            <a:r>
+              <a:rPr lang="en-US" dirty="0" err="1"/>
+              <a:t>iHand</a:t>
+            </a:r>
+            <a:r>
+              <a:rPr lang="en-US" dirty="0"/>
+              <a:t>: an interactive bare-hand-based augmented reality interface on commercial mobile phones." </a:t>
+            </a:r>
+            <a:r>
+              <a:rPr lang="en-US" i="1" dirty="0"/>
+              <a:t>Optical Engineering</a:t>
+            </a:r>
+            <a:r>
+              <a:rPr lang="en-US" dirty="0"/>
+              <a:t> 52.2 (2013): 027206-027206.</a:t>
+            </a:r>
+          </a:p>
+        </p:txBody>
+      </p:sp>
+    </p:spTree>
+    <p:extLst>
+      <p:ext uri="{BB962C8B-B14F-4D97-AF65-F5344CB8AC3E}">
+        <p14:creationId xmlns:p14="http://schemas.microsoft.com/office/powerpoint/2010/main" val="3597422835"/>
+      </p:ext>
+    </p:extLst>
+  </p:cSld>
+  <p:clrMapOvr>
+    <a:masterClrMapping/>
+  </p:clrMapOvr>
+  <p:timing>
+    <p:tnLst>
+      <p:par>
+        <p:cTn id="1" dur="indefinite" restart="never" nodeType="tmRoot"/>
+      </p:par>
+    </p:tnLst>
+  </p:timing>
+</p:sld>
+</file>
+
+<file path=ppt/slides/slide11.xml><?xml version="1.0" encoding="utf-8"?>
+<p:sld xmlns:a="http://schemas.openxmlformats.org/drawingml/2006/main" xmlns:r="http://schemas.openxmlformats.org/officeDocument/2006/relationships" xmlns:p="http://schemas.openxmlformats.org/presentationml/2006/main">
+  <p:cSld>
+    <p:spTree>
+      <p:nvGrpSpPr>
+        <p:cNvPr id="1" name=""/>
+        <p:cNvGrpSpPr/>
+        <p:nvPr/>
+      </p:nvGrpSpPr>
+      <p:grpSpPr>
+        <a:xfrm>
+          <a:off x="0" y="0"/>
+          <a:ext cx="0" cy="0"/>
+          <a:chOff x="0" y="0"/>
+          <a:chExt cx="0" cy="0"/>
+        </a:xfrm>
+      </p:grpSpPr>
+      <p:sp>
+        <p:nvSpPr>
+          <p:cNvPr id="2" name="Title 1"/>
+          <p:cNvSpPr>
+            <a:spLocks noGrp="1"/>
+          </p:cNvSpPr>
+          <p:nvPr>
+            <p:ph type="title"/>
+          </p:nvPr>
+        </p:nvSpPr>
+        <p:spPr/>
+        <p:txBody>
+          <a:bodyPr/>
+          <a:lstStyle/>
+          <a:p>
+            <a:r>
+              <a:rPr lang="en-US" dirty="0" smtClean="0"/>
+              <a:t>Adaptive Graph Construction</a:t>
+            </a:r>
+            <a:endParaRPr lang="en-US" dirty="0"/>
+          </a:p>
+        </p:txBody>
+      </p:sp>
+      <p:pic>
+        <p:nvPicPr>
+          <p:cNvPr id="4" name="video_hist_error">
+            <a:hlinkClick r:id="" action="ppaction://media"/>
+          </p:cNvPr>
+          <p:cNvPicPr>
+            <a:picLocks noGrp="1" noChangeAspect="1"/>
+          </p:cNvPicPr>
+          <p:nvPr>
+            <p:ph idx="1"/>
+            <a:videoFile r:link="rId2"/>
+            <p:extLst>
+              <p:ext uri="{DAA4B4D4-6D71-4841-9C94-3DE7FCFB9230}">
+                <p14:media xmlns:p14="http://schemas.microsoft.com/office/powerpoint/2010/main" r:embed="rId1"/>
+              </p:ext>
+            </p:extLst>
+          </p:nvPr>
+        </p:nvPicPr>
+        <p:blipFill>
+          <a:blip r:embed="rId4"/>
+          <a:stretch>
+            <a:fillRect/>
+          </a:stretch>
+        </p:blipFill>
+        <p:spPr>
+          <a:xfrm>
+            <a:off x="2227263" y="1825625"/>
+            <a:ext cx="7735887" cy="4351338"/>
+          </a:xfrm>
+        </p:spPr>
+      </p:pic>
+    </p:spTree>
+    <p:extLst>
+      <p:ext uri="{BB962C8B-B14F-4D97-AF65-F5344CB8AC3E}">
+        <p14:creationId xmlns:p14="http://schemas.microsoft.com/office/powerpoint/2010/main" val="3041454240"/>
+      </p:ext>
+    </p:extLst>
+  </p:cSld>
+  <p:clrMapOvr>
+    <a:masterClrMapping/>
+  </p:clrMapOvr>
+  <p:timing>
+    <p:tnLst>
+      <p:par>
+        <p:cTn id="1" dur="indefinite" restart="never" nodeType="tmRoot">
+          <p:childTnLst>
+            <p:seq concurrent="1" nextAc="seek">
+              <p:cTn id="2" restart="whenNotActive" fill="hold" evtFilter="cancelBubble" nodeType="interactiveSeq">
+                <p:stCondLst>
+                  <p:cond evt="onClick" delay="0">
+                    <p:tgtEl>
+                      <p:spTgt spid="4"/>
+                    </p:tgtEl>
+                  </p:cond>
+                </p:stCondLst>
+                <p:endSync evt="end" delay="0">
+                  <p:rtn val="all"/>
+                </p:endSync>
+                <p:childTnLst>
+                  <p:par>
+                    <p:cTn id="3" fill="hold">
+                      <p:stCondLst>
+                        <p:cond delay="0"/>
+                      </p:stCondLst>
+                      <p:childTnLst>
+                        <p:par>
+                          <p:cTn id="4" fill="hold">
+                            <p:stCondLst>
+                              <p:cond delay="0"/>
+                            </p:stCondLst>
+                            <p:childTnLst>
+                              <p:par>
+                                <p:cTn id="5" presetID="2" presetClass="mediacall" presetSubtype="0" fill="hold" nodeType="clickEffect">
+                                  <p:stCondLst>
+                                    <p:cond delay="0"/>
+                                  </p:stCondLst>
+                                  <p:childTnLst>
+                                    <p:cmd type="call" cmd="togglePause">
+                                      <p:cBhvr>
+                                        <p:cTn id="6" dur="1" fill="hold"/>
+                                        <p:tgtEl>
+                                          <p:spTgt spid="4"/>
+                                        </p:tgtEl>
+                                      </p:cBhvr>
+                                    </p:cmd>
+                                  </p:childTnLst>
+                                </p:cTn>
+                              </p:par>
+                            </p:childTnLst>
+                          </p:cTn>
+                        </p:par>
+                      </p:childTnLst>
+                    </p:cTn>
+                  </p:par>
+                </p:childTnLst>
+              </p:cTn>
+              <p:nextCondLst>
+                <p:cond evt="onClick" delay="0">
+                  <p:tgtEl>
+                    <p:spTgt spid="4"/>
+                  </p:tgtEl>
+                </p:cond>
+              </p:nextCondLst>
+            </p:seq>
+            <p:video>
+              <p:cMediaNode vol="80000">
+                <p:cTn id="7" fill="hold" display="0">
+                  <p:stCondLst>
+                    <p:cond delay="indefinite"/>
+                  </p:stCondLst>
+                </p:cTn>
+                <p:tgtEl>
+                  <p:spTgt spid="4"/>
+                </p:tgtEl>
+              </p:cMediaNode>
+            </p:video>
+          </p:childTnLst>
+        </p:cTn>
+      </p:par>
+    </p:tnLst>
+  </p:timing>
+</p:sld>
+</file>
+
+<file path=ppt/slides/slide12.xml><?xml version="1.0" encoding="utf-8"?>
+<p:sld xmlns:a="http://schemas.openxmlformats.org/drawingml/2006/main" xmlns:r="http://schemas.openxmlformats.org/officeDocument/2006/relationships" xmlns:p="http://schemas.openxmlformats.org/presentationml/2006/main">
+  <p:cSld>
+    <p:spTree>
+      <p:nvGrpSpPr>
+        <p:cNvPr id="1" name=""/>
+        <p:cNvGrpSpPr/>
+        <p:nvPr/>
+      </p:nvGrpSpPr>
+      <p:grpSpPr>
+        <a:xfrm>
+          <a:off x="0" y="0"/>
+          <a:ext cx="0" cy="0"/>
+          <a:chOff x="0" y="0"/>
+          <a:chExt cx="0" cy="0"/>
+        </a:xfrm>
+      </p:grpSpPr>
+      <p:sp>
+        <p:nvSpPr>
+          <p:cNvPr id="2" name="Title 1"/>
+          <p:cNvSpPr>
+            <a:spLocks noGrp="1"/>
+          </p:cNvSpPr>
+          <p:nvPr>
+            <p:ph type="title"/>
+          </p:nvPr>
+        </p:nvSpPr>
+        <p:spPr/>
+        <p:txBody>
+          <a:bodyPr/>
+          <a:lstStyle/>
+          <a:p>
+            <a:r>
+              <a:rPr lang="en-US" dirty="0" smtClean="0"/>
+              <a:t>Quantitative Results: 100 Workers</a:t>
+            </a:r>
+            <a:endParaRPr lang="en-US" dirty="0"/>
+          </a:p>
+        </p:txBody>
+      </p:sp>
+      <p:pic>
+        <p:nvPicPr>
+          <p:cNvPr id="3" name="Picture 2"/>
+          <p:cNvPicPr>
+            <a:picLocks noChangeAspect="1"/>
+          </p:cNvPicPr>
+          <p:nvPr/>
+        </p:nvPicPr>
+        <p:blipFill>
+          <a:blip r:embed="rId2"/>
+          <a:stretch>
+            <a:fillRect/>
+          </a:stretch>
+        </p:blipFill>
+        <p:spPr>
+          <a:xfrm>
+            <a:off x="2514899" y="1690688"/>
+            <a:ext cx="7162201" cy="4544801"/>
+          </a:xfrm>
+          <a:prstGeom prst="rect">
+            <a:avLst/>
+          </a:prstGeom>
+        </p:spPr>
+      </p:pic>
+    </p:spTree>
+    <p:extLst>
+      <p:ext uri="{BB962C8B-B14F-4D97-AF65-F5344CB8AC3E}">
+        <p14:creationId xmlns:p14="http://schemas.microsoft.com/office/powerpoint/2010/main" val="467641072"/>
+      </p:ext>
+    </p:extLst>
+  </p:cSld>
+  <p:clrMapOvr>
+    <a:masterClrMapping/>
+  </p:clrMapOvr>
+  <p:timing>
+    <p:tnLst>
+      <p:par>
+        <p:cTn id="1" dur="indefinite" restart="never" nodeType="tmRoot"/>
+      </p:par>
+    </p:tnLst>
+  </p:timing>
+</p:sld>
+</file>
+
+<file path=ppt/slides/slide13.xml><?xml version="1.0" encoding="utf-8"?>
+<p:sld xmlns:a="http://schemas.openxmlformats.org/drawingml/2006/main" xmlns:r="http://schemas.openxmlformats.org/officeDocument/2006/relationships" xmlns:p="http://schemas.openxmlformats.org/presentationml/2006/main">
+  <p:cSld>
+    <p:spTree>
+      <p:nvGrpSpPr>
+        <p:cNvPr id="1" name=""/>
+        <p:cNvGrpSpPr/>
+        <p:nvPr/>
+      </p:nvGrpSpPr>
+      <p:grpSpPr>
+        <a:xfrm>
+          <a:off x="0" y="0"/>
+          <a:ext cx="0" cy="0"/>
+          <a:chOff x="0" y="0"/>
+          <a:chExt cx="0" cy="0"/>
+        </a:xfrm>
+      </p:grpSpPr>
+      <p:sp>
+        <p:nvSpPr>
+          <p:cNvPr id="2" name="Title 1"/>
+          <p:cNvSpPr>
+            <a:spLocks noGrp="1"/>
+          </p:cNvSpPr>
+          <p:nvPr>
+            <p:ph type="title"/>
+          </p:nvPr>
+        </p:nvSpPr>
+        <p:spPr/>
+        <p:txBody>
+          <a:bodyPr/>
+          <a:lstStyle/>
+          <a:p>
+            <a:r>
+              <a:rPr lang="en-US" dirty="0" smtClean="0"/>
+              <a:t>Quantitative Results: 30 Workers</a:t>
+            </a:r>
+            <a:endParaRPr lang="en-US" dirty="0"/>
+          </a:p>
+        </p:txBody>
+      </p:sp>
+      <p:pic>
+        <p:nvPicPr>
+          <p:cNvPr id="4" name="Picture 3"/>
+          <p:cNvPicPr>
+            <a:picLocks noChangeAspect="1"/>
+          </p:cNvPicPr>
+          <p:nvPr/>
+        </p:nvPicPr>
+        <p:blipFill>
+          <a:blip r:embed="rId2"/>
+          <a:stretch>
+            <a:fillRect/>
+          </a:stretch>
+        </p:blipFill>
+        <p:spPr>
+          <a:xfrm>
+            <a:off x="2545949" y="1690688"/>
+            <a:ext cx="7100101" cy="4472001"/>
+          </a:xfrm>
+          <a:prstGeom prst="rect">
+            <a:avLst/>
+          </a:prstGeom>
+        </p:spPr>
+      </p:pic>
+    </p:spTree>
+    <p:extLst>
+      <p:ext uri="{BB962C8B-B14F-4D97-AF65-F5344CB8AC3E}">
+        <p14:creationId xmlns:p14="http://schemas.microsoft.com/office/powerpoint/2010/main" val="1990384304"/>
+      </p:ext>
+    </p:extLst>
+  </p:cSld>
+  <p:clrMapOvr>
+    <a:masterClrMapping/>
+  </p:clrMapOvr>
+  <p:timing>
+    <p:tnLst>
+      <p:par>
+        <p:cTn id="1" dur="indefinite" restart="never" nodeType="tmRoot"/>
+      </p:par>
+    </p:tnLst>
+  </p:timing>
+</p:sld>
+</file>
+
 <file path=ppt/slides/slide2.xml><?xml version="1.0" encoding="utf-8"?>
 <p:sld xmlns:a="http://schemas.openxmlformats.org/drawingml/2006/main" xmlns:r="http://schemas.openxmlformats.org/officeDocument/2006/relationships" xmlns:p="http://schemas.openxmlformats.org/presentationml/2006/main">
   <p:cSld>
@@ -3184,6 +3645,13 @@
   <p:clrMapOvr>
     <a:masterClrMapping/>
   </p:clrMapOvr>
+  <p:timing>
+    <p:tnLst>
+      <p:par>
+        <p:cTn id="1" dur="indefinite" restart="never" nodeType="tmRoot"/>
+      </p:par>
+    </p:tnLst>
+  </p:timing>
 </p:sld>
 </file>
 
@@ -3809,7 +4277,7 @@
           <a:graphicData uri="http://schemas.openxmlformats.org/presentationml/2006/ole">
             <mc:AlternateContent xmlns:mc="http://schemas.openxmlformats.org/markup-compatibility/2006">
               <mc:Choice xmlns:v="urn:schemas-microsoft-com:vml" Requires="v">
-                <p:oleObj spid="_x0000_s2063" name="Equation" r:id="rId3" imgW="1803240" imgH="457200" progId="Equation.DSMT4">
+                <p:oleObj spid="_x0000_s2091" name="Equation" r:id="rId3" imgW="1803240" imgH="457200" progId="Equation.DSMT4">
                   <p:embed/>
                 </p:oleObj>
               </mc:Choice>
@@ -3866,7 +4334,7 @@
           <a:graphicData uri="http://schemas.openxmlformats.org/presentationml/2006/ole">
             <mc:AlternateContent xmlns:mc="http://schemas.openxmlformats.org/markup-compatibility/2006">
               <mc:Choice xmlns:v="urn:schemas-microsoft-com:vml" Requires="v">
-                <p:oleObj spid="_x0000_s2064" name="Equation" r:id="rId5" imgW="1015920" imgH="482400" progId="Equation.DSMT4">
+                <p:oleObj spid="_x0000_s2092" name="Equation" r:id="rId5" imgW="1015920" imgH="482400" progId="Equation.DSMT4">
                   <p:embed/>
                 </p:oleObj>
               </mc:Choice>
@@ -3923,7 +4391,7 @@
           <a:graphicData uri="http://schemas.openxmlformats.org/presentationml/2006/ole">
             <mc:AlternateContent xmlns:mc="http://schemas.openxmlformats.org/markup-compatibility/2006">
               <mc:Choice xmlns:v="urn:schemas-microsoft-com:vml" Requires="v">
-                <p:oleObj spid="_x0000_s2065" name="Equation" r:id="rId7" imgW="914400" imgH="177480" progId="Equation.DSMT4">
+                <p:oleObj spid="_x0000_s2093" name="Equation" r:id="rId7" imgW="914400" imgH="177480" progId="Equation.DSMT4">
                   <p:embed/>
                 </p:oleObj>
               </mc:Choice>
@@ -3980,7 +4448,7 @@
           <a:graphicData uri="http://schemas.openxmlformats.org/presentationml/2006/ole">
             <mc:AlternateContent xmlns:mc="http://schemas.openxmlformats.org/markup-compatibility/2006">
               <mc:Choice xmlns:v="urn:schemas-microsoft-com:vml" Requires="v">
-                <p:oleObj spid="_x0000_s2066" name="Equation" r:id="rId9" imgW="1002960" imgH="241200" progId="Equation.DSMT4">
+                <p:oleObj spid="_x0000_s2094" name="Equation" r:id="rId9" imgW="1002960" imgH="241200" progId="Equation.DSMT4">
                   <p:embed/>
                 </p:oleObj>
               </mc:Choice>
@@ -4582,7 +5050,7 @@
           <a:graphicData uri="http://schemas.openxmlformats.org/presentationml/2006/ole">
             <mc:AlternateContent xmlns:mc="http://schemas.openxmlformats.org/markup-compatibility/2006">
               <mc:Choice xmlns:v="urn:schemas-microsoft-com:vml" Requires="v">
-                <p:oleObj spid="_x0000_s3083" name="Equation" r:id="rId4" imgW="88560" imgH="164880" progId="Equation.DSMT4">
+                <p:oleObj spid="_x0000_s3104" name="Equation" r:id="rId4" imgW="88560" imgH="164880" progId="Equation.DSMT4">
                   <p:embed/>
                 </p:oleObj>
               </mc:Choice>
@@ -4731,7 +5199,7 @@
           <a:graphicData uri="http://schemas.openxmlformats.org/presentationml/2006/ole">
             <mc:AlternateContent xmlns:mc="http://schemas.openxmlformats.org/markup-compatibility/2006">
               <mc:Choice xmlns:v="urn:schemas-microsoft-com:vml" Requires="v">
-                <p:oleObj spid="_x0000_s3084" name="Equation" r:id="rId6" imgW="152280" imgH="228600" progId="Equation.DSMT4">
+                <p:oleObj spid="_x0000_s3105" name="Equation" r:id="rId6" imgW="152280" imgH="228600" progId="Equation.DSMT4">
                   <p:embed/>
                 </p:oleObj>
               </mc:Choice>
@@ -4788,7 +5256,7 @@
           <a:graphicData uri="http://schemas.openxmlformats.org/presentationml/2006/ole">
             <mc:AlternateContent xmlns:mc="http://schemas.openxmlformats.org/markup-compatibility/2006">
               <mc:Choice xmlns:v="urn:schemas-microsoft-com:vml" Requires="v">
-                <p:oleObj spid="_x0000_s3085" name="Equation" r:id="rId8" imgW="164880" imgH="228600" progId="Equation.DSMT4">
+                <p:oleObj spid="_x0000_s3106" name="Equation" r:id="rId8" imgW="164880" imgH="228600" progId="Equation.DSMT4">
                   <p:embed/>
                 </p:oleObj>
               </mc:Choice>
@@ -5403,7 +5871,7 @@
           <a:graphicData uri="http://schemas.openxmlformats.org/presentationml/2006/ole">
             <mc:AlternateContent xmlns:mc="http://schemas.openxmlformats.org/markup-compatibility/2006">
               <mc:Choice xmlns:v="urn:schemas-microsoft-com:vml" Requires="v">
-                <p:oleObj spid="_x0000_s4110" name="Equation" r:id="rId3" imgW="126720" imgH="228600" progId="Equation.DSMT4">
+                <p:oleObj spid="_x0000_s4138" name="Equation" r:id="rId3" imgW="126720" imgH="228600" progId="Equation.DSMT4">
                   <p:embed/>
                 </p:oleObj>
               </mc:Choice>
@@ -5506,7 +5974,7 @@
           <a:graphicData uri="http://schemas.openxmlformats.org/presentationml/2006/ole">
             <mc:AlternateContent xmlns:mc="http://schemas.openxmlformats.org/markup-compatibility/2006">
               <mc:Choice xmlns:v="urn:schemas-microsoft-com:vml" Requires="v">
-                <p:oleObj spid="_x0000_s4111" name="Equation" r:id="rId5" imgW="126720" imgH="190440" progId="Equation.DSMT4">
+                <p:oleObj spid="_x0000_s4139" name="Equation" r:id="rId5" imgW="126720" imgH="190440" progId="Equation.DSMT4">
                   <p:embed/>
                 </p:oleObj>
               </mc:Choice>
@@ -5763,7 +6231,7 @@
           <a:graphicData uri="http://schemas.openxmlformats.org/presentationml/2006/ole">
             <mc:AlternateContent xmlns:mc="http://schemas.openxmlformats.org/markup-compatibility/2006">
               <mc:Choice xmlns:v="urn:schemas-microsoft-com:vml" Requires="v">
-                <p:oleObj spid="_x0000_s4112" name="Equation" r:id="rId7" imgW="114120" imgH="228600" progId="Equation.DSMT4">
+                <p:oleObj spid="_x0000_s4140" name="Equation" r:id="rId7" imgW="114120" imgH="228600" progId="Equation.DSMT4">
                   <p:embed/>
                 </p:oleObj>
               </mc:Choice>
@@ -5820,7 +6288,7 @@
           <a:graphicData uri="http://schemas.openxmlformats.org/presentationml/2006/ole">
             <mc:AlternateContent xmlns:mc="http://schemas.openxmlformats.org/markup-compatibility/2006">
               <mc:Choice xmlns:v="urn:schemas-microsoft-com:vml" Requires="v">
-                <p:oleObj spid="_x0000_s4113" name="Equation" r:id="rId9" imgW="126720" imgH="228600" progId="Equation.DSMT4">
+                <p:oleObj spid="_x0000_s4141" name="Equation" r:id="rId9" imgW="126720" imgH="228600" progId="Equation.DSMT4">
                   <p:embed/>
                 </p:oleObj>
               </mc:Choice>
@@ -5972,30 +6440,174 @@
           <a:p>
             <a:r>
               <a:rPr lang="en-US" dirty="0" smtClean="0"/>
-              <a:t>EM with Prior</a:t>
+              <a:t>EM with Beta Prior: </a:t>
             </a:r>
             <a:endParaRPr lang="en-US" dirty="0"/>
           </a:p>
         </p:txBody>
       </p:sp>
+      <p:sp>
+        <p:nvSpPr>
+          <p:cNvPr id="5" name="TextBox 4"/>
+          <p:cNvSpPr txBox="1"/>
+          <p:nvPr/>
+        </p:nvSpPr>
+        <p:spPr>
+          <a:xfrm>
+            <a:off x="838200" y="1920240"/>
+            <a:ext cx="1731155" cy="584775"/>
+          </a:xfrm>
+          <a:prstGeom prst="rect">
+            <a:avLst/>
+          </a:prstGeom>
+          <a:noFill/>
+        </p:spPr>
+        <p:txBody>
+          <a:bodyPr wrap="square" rtlCol="0">
+            <a:spAutoFit/>
+          </a:bodyPr>
+          <a:lstStyle/>
+          <a:p>
+            <a:r>
+              <a:rPr lang="en-US" sz="3200" b="1" dirty="0"/>
+              <a:t>M</a:t>
+            </a:r>
+            <a:r>
+              <a:rPr lang="en-US" sz="3200" b="1" dirty="0" smtClean="0"/>
+              <a:t> Step:</a:t>
+            </a:r>
+            <a:endParaRPr lang="en-US" sz="3200" b="1" dirty="0"/>
+          </a:p>
+        </p:txBody>
+      </p:sp>
+      <p:sp>
+        <p:nvSpPr>
+          <p:cNvPr id="6" name="TextBox 5"/>
+          <p:cNvSpPr txBox="1"/>
+          <p:nvPr/>
+        </p:nvSpPr>
+        <p:spPr>
+          <a:xfrm>
+            <a:off x="4277360" y="4669127"/>
+            <a:ext cx="3230880" cy="553998"/>
+          </a:xfrm>
+          <a:prstGeom prst="rect">
+            <a:avLst/>
+          </a:prstGeom>
+          <a:noFill/>
+        </p:spPr>
+        <p:txBody>
+          <a:bodyPr wrap="square" lIns="0" tIns="0" rIns="0" bIns="0" rtlCol="0">
+            <a:spAutoFit/>
+          </a:bodyPr>
+          <a:lstStyle/>
+          <a:p>
+            <a:endParaRPr lang="en-US" dirty="0" smtClean="0"/>
+          </a:p>
+          <a:p>
+            <a:endParaRPr lang="en-US" dirty="0"/>
+          </a:p>
+        </p:txBody>
+      </p:sp>
+      <p:graphicFrame>
+        <p:nvGraphicFramePr>
+          <p:cNvPr id="7" name="Object 6"/>
+          <p:cNvGraphicFramePr>
+            <a:graphicFrameLocks noChangeAspect="1"/>
+          </p:cNvGraphicFramePr>
+          <p:nvPr>
+            <p:extLst>
+              <p:ext uri="{D42A27DB-BD31-4B8C-83A1-F6EECF244321}">
+                <p14:modId xmlns:p14="http://schemas.microsoft.com/office/powerpoint/2010/main" val="1035021077"/>
+              </p:ext>
+            </p:extLst>
+          </p:nvPr>
+        </p:nvGraphicFramePr>
+        <p:xfrm>
+          <a:off x="5408929" y="607695"/>
+          <a:ext cx="3582852" cy="840422"/>
+        </p:xfrm>
+        <a:graphic>
+          <a:graphicData uri="http://schemas.openxmlformats.org/presentationml/2006/ole">
+            <mc:AlternateContent xmlns:mc="http://schemas.openxmlformats.org/markup-compatibility/2006">
+              <mc:Choice xmlns:v="urn:schemas-microsoft-com:vml" Requires="v">
+                <p:oleObj spid="_x0000_s7172" name="Equation" r:id="rId3" imgW="1028520" imgH="241200" progId="Equation.DSMT4">
+                  <p:embed/>
+                </p:oleObj>
+              </mc:Choice>
+              <mc:Fallback>
+                <p:oleObj name="Equation" r:id="rId3" imgW="1028520" imgH="241200" progId="Equation.DSMT4">
+                  <p:embed/>
+                  <p:pic>
+                    <p:nvPicPr>
+                      <p:cNvPr id="0" name=""/>
+                      <p:cNvPicPr/>
+                      <p:nvPr/>
+                    </p:nvPicPr>
+                    <p:blipFill>
+                      <a:blip r:embed="rId4"/>
+                      <a:stretch>
+                        <a:fillRect/>
+                      </a:stretch>
+                    </p:blipFill>
+                    <p:spPr>
+                      <a:xfrm>
+                        <a:off x="5408929" y="607695"/>
+                        <a:ext cx="3582852" cy="840422"/>
+                      </a:xfrm>
+                      <a:prstGeom prst="rect">
+                        <a:avLst/>
+                      </a:prstGeom>
+                    </p:spPr>
+                  </p:pic>
+                </p:oleObj>
+              </mc:Fallback>
+            </mc:AlternateContent>
+          </a:graphicData>
+        </a:graphic>
+      </p:graphicFrame>
       <p:pic>
         <p:nvPicPr>
-          <p:cNvPr id="4" name="Picture 3"/>
+          <p:cNvPr id="12" name="Picture 11"/>
           <p:cNvPicPr>
             <a:picLocks noChangeAspect="1"/>
           </p:cNvPicPr>
           <p:nvPr/>
         </p:nvPicPr>
         <p:blipFill>
-          <a:blip r:embed="rId2"/>
+          <a:blip r:embed="rId5"/>
           <a:stretch>
             <a:fillRect/>
           </a:stretch>
         </p:blipFill>
         <p:spPr>
           <a:xfrm>
-            <a:off x="2019892" y="1690688"/>
-            <a:ext cx="8152216" cy="5050830"/>
+            <a:off x="838200" y="2752229"/>
+            <a:ext cx="10783547" cy="1916898"/>
+          </a:xfrm>
+          <a:prstGeom prst="rect">
+            <a:avLst/>
+          </a:prstGeom>
+        </p:spPr>
+      </p:pic>
+      <p:pic>
+        <p:nvPicPr>
+          <p:cNvPr id="13" name="Picture 12"/>
+          <p:cNvPicPr>
+            <a:picLocks noChangeAspect="1"/>
+          </p:cNvPicPr>
+          <p:nvPr/>
+        </p:nvPicPr>
+        <p:blipFill>
+          <a:blip r:embed="rId6"/>
+          <a:stretch>
+            <a:fillRect/>
+          </a:stretch>
+        </p:blipFill>
+        <p:spPr>
+          <a:xfrm>
+            <a:off x="838200" y="5204170"/>
+            <a:ext cx="5327004" cy="526498"/>
           </a:xfrm>
           <a:prstGeom prst="rect">
             <a:avLst/>
@@ -6012,6 +6624,13 @@
   <p:clrMapOvr>
     <a:masterClrMapping/>
   </p:clrMapOvr>
+  <p:timing>
+    <p:tnLst>
+      <p:par>
+        <p:cTn id="1" dur="indefinite" restart="never" nodeType="tmRoot"/>
+      </p:par>
+    </p:tnLst>
+  </p:timing>
 </p:sld>
 </file>
 
@@ -6034,18 +6653,279 @@
       </p:grpSpPr>
       <p:sp>
         <p:nvSpPr>
-          <p:cNvPr id="2" name="Rectangle 1"/>
-          <p:cNvSpPr/>
+          <p:cNvPr id="2" name="Title 1"/>
+          <p:cNvSpPr>
+            <a:spLocks noGrp="1"/>
+          </p:cNvSpPr>
+          <p:nvPr>
+            <p:ph type="title"/>
+          </p:nvPr>
+        </p:nvSpPr>
+        <p:spPr/>
+        <p:txBody>
+          <a:bodyPr/>
+          <a:lstStyle/>
+          <a:p>
+            <a:r>
+              <a:rPr lang="en-US" dirty="0" smtClean="0"/>
+              <a:t>EM with Beta Prior:</a:t>
+            </a:r>
+            <a:endParaRPr lang="en-US" dirty="0"/>
+          </a:p>
+        </p:txBody>
+      </p:sp>
+      <p:graphicFrame>
+        <p:nvGraphicFramePr>
+          <p:cNvPr id="3" name="Object 2"/>
+          <p:cNvGraphicFramePr>
+            <a:graphicFrameLocks noChangeAspect="1"/>
+          </p:cNvGraphicFramePr>
+          <p:nvPr>
+            <p:extLst>
+              <p:ext uri="{D42A27DB-BD31-4B8C-83A1-F6EECF244321}">
+                <p14:modId xmlns:p14="http://schemas.microsoft.com/office/powerpoint/2010/main" val="479839335"/>
+              </p:ext>
+            </p:extLst>
+          </p:nvPr>
+        </p:nvGraphicFramePr>
+        <p:xfrm>
+          <a:off x="5502593" y="608012"/>
+          <a:ext cx="5219700" cy="839787"/>
+        </p:xfrm>
+        <a:graphic>
+          <a:graphicData uri="http://schemas.openxmlformats.org/presentationml/2006/ole">
+            <mc:AlternateContent xmlns:mc="http://schemas.openxmlformats.org/markup-compatibility/2006">
+              <mc:Choice xmlns:v="urn:schemas-microsoft-com:vml" Requires="v">
+                <p:oleObj spid="_x0000_s8196" name="Equation" r:id="rId3" imgW="1498320" imgH="241200" progId="Equation.DSMT4">
+                  <p:embed/>
+                </p:oleObj>
+              </mc:Choice>
+              <mc:Fallback>
+                <p:oleObj name="Equation" r:id="rId3" imgW="1498320" imgH="241200" progId="Equation.DSMT4">
+                  <p:embed/>
+                  <p:pic>
+                    <p:nvPicPr>
+                      <p:cNvPr id="0" name=""/>
+                      <p:cNvPicPr/>
+                      <p:nvPr/>
+                    </p:nvPicPr>
+                    <p:blipFill>
+                      <a:blip r:embed="rId4"/>
+                      <a:stretch>
+                        <a:fillRect/>
+                      </a:stretch>
+                    </p:blipFill>
+                    <p:spPr>
+                      <a:xfrm>
+                        <a:off x="5502593" y="608012"/>
+                        <a:ext cx="5219700" cy="839787"/>
+                      </a:xfrm>
+                      <a:prstGeom prst="rect">
+                        <a:avLst/>
+                      </a:prstGeom>
+                    </p:spPr>
+                  </p:pic>
+                </p:oleObj>
+              </mc:Fallback>
+            </mc:AlternateContent>
+          </a:graphicData>
+        </a:graphic>
+      </p:graphicFrame>
+      <p:pic>
+        <p:nvPicPr>
+          <p:cNvPr id="4" name="Picture 3"/>
+          <p:cNvPicPr>
+            <a:picLocks noChangeAspect="1"/>
+          </p:cNvPicPr>
           <p:nvPr/>
-        </p:nvSpPr>
-        <p:spPr>
-          <a:xfrm>
-            <a:off x="223520" y="355600"/>
-            <a:ext cx="1635760" cy="914400"/>
+        </p:nvPicPr>
+        <p:blipFill>
+          <a:blip r:embed="rId5"/>
+          <a:stretch>
+            <a:fillRect/>
+          </a:stretch>
+        </p:blipFill>
+        <p:spPr>
+          <a:xfrm>
+            <a:off x="702930" y="2388360"/>
+            <a:ext cx="10773620" cy="740920"/>
           </a:xfrm>
           <a:prstGeom prst="rect">
             <a:avLst/>
           </a:prstGeom>
+        </p:spPr>
+      </p:pic>
+      <p:sp>
+        <p:nvSpPr>
+          <p:cNvPr id="5" name="TextBox 4"/>
+          <p:cNvSpPr txBox="1"/>
+          <p:nvPr/>
+        </p:nvSpPr>
+        <p:spPr>
+          <a:xfrm>
+            <a:off x="838200" y="4124960"/>
+            <a:ext cx="5191760" cy="1384995"/>
+          </a:xfrm>
+          <a:prstGeom prst="rect">
+            <a:avLst/>
+          </a:prstGeom>
+          <a:noFill/>
+        </p:spPr>
+        <p:txBody>
+          <a:bodyPr wrap="square" rtlCol="0">
+            <a:spAutoFit/>
+          </a:bodyPr>
+          <a:lstStyle/>
+          <a:p>
+            <a:pPr marL="342900" indent="-342900">
+              <a:buFont typeface="Arial" panose="020B0604020202020204" pitchFamily="34" charset="0"/>
+              <a:buChar char="•"/>
+            </a:pPr>
+            <a:r>
+              <a:rPr lang="en-US" sz="2800" dirty="0" smtClean="0"/>
+              <a:t>Quadratic with 2 root</a:t>
+            </a:r>
+          </a:p>
+          <a:p>
+            <a:pPr marL="800100" lvl="1" indent="-342900">
+              <a:buFont typeface="Arial" panose="020B0604020202020204" pitchFamily="34" charset="0"/>
+              <a:buChar char="•"/>
+            </a:pPr>
+            <a:r>
+              <a:rPr lang="en-US" sz="2800" dirty="0" smtClean="0"/>
+              <a:t>One root below 0.1 </a:t>
+            </a:r>
+          </a:p>
+          <a:p>
+            <a:pPr marL="800100" lvl="1" indent="-342900">
+              <a:buFont typeface="Arial" panose="020B0604020202020204" pitchFamily="34" charset="0"/>
+              <a:buChar char="•"/>
+            </a:pPr>
+            <a:r>
+              <a:rPr lang="en-US" sz="2800" dirty="0" smtClean="0"/>
+              <a:t>One root between 0.1 and 1</a:t>
+            </a:r>
+            <a:endParaRPr lang="en-US" sz="2800" dirty="0"/>
+          </a:p>
+        </p:txBody>
+      </p:sp>
+      <p:pic>
+        <p:nvPicPr>
+          <p:cNvPr id="7" name="Picture 6"/>
+          <p:cNvPicPr>
+            <a:picLocks noChangeAspect="1"/>
+          </p:cNvPicPr>
+          <p:nvPr/>
+        </p:nvPicPr>
+        <p:blipFill>
+          <a:blip r:embed="rId6" cstate="print">
+            <a:extLst>
+              <a:ext uri="{28A0092B-C50C-407E-A947-70E740481C1C}">
+                <a14:useLocalDpi xmlns:a14="http://schemas.microsoft.com/office/drawing/2010/main" val="0"/>
+              </a:ext>
+            </a:extLst>
+          </a:blip>
+          <a:stretch>
+            <a:fillRect/>
+          </a:stretch>
+        </p:blipFill>
+        <p:spPr>
+          <a:xfrm>
+            <a:off x="4907280" y="4632172"/>
+            <a:ext cx="333224" cy="333224"/>
+          </a:xfrm>
+          <a:prstGeom prst="rect">
+            <a:avLst/>
+          </a:prstGeom>
+        </p:spPr>
+      </p:pic>
+      <p:pic>
+        <p:nvPicPr>
+          <p:cNvPr id="8" name="Picture 7"/>
+          <p:cNvPicPr>
+            <a:picLocks noChangeAspect="1"/>
+          </p:cNvPicPr>
+          <p:nvPr/>
+        </p:nvPicPr>
+        <p:blipFill>
+          <a:blip r:embed="rId7" cstate="print">
+            <a:extLst>
+              <a:ext uri="{28A0092B-C50C-407E-A947-70E740481C1C}">
+                <a14:useLocalDpi xmlns:a14="http://schemas.microsoft.com/office/drawing/2010/main" val="0"/>
+              </a:ext>
+            </a:extLst>
+          </a:blip>
+          <a:stretch>
+            <a:fillRect/>
+          </a:stretch>
+        </p:blipFill>
+        <p:spPr>
+          <a:xfrm>
+            <a:off x="6029960" y="5056836"/>
+            <a:ext cx="426682" cy="327834"/>
+          </a:xfrm>
+          <a:prstGeom prst="rect">
+            <a:avLst/>
+          </a:prstGeom>
+        </p:spPr>
+      </p:pic>
+    </p:spTree>
+    <p:extLst>
+      <p:ext uri="{BB962C8B-B14F-4D97-AF65-F5344CB8AC3E}">
+        <p14:creationId xmlns:p14="http://schemas.microsoft.com/office/powerpoint/2010/main" val="3322630994"/>
+      </p:ext>
+    </p:extLst>
+  </p:cSld>
+  <p:clrMapOvr>
+    <a:masterClrMapping/>
+  </p:clrMapOvr>
+  <p:timing>
+    <p:tnLst>
+      <p:par>
+        <p:cTn id="1" dur="indefinite" restart="never" nodeType="tmRoot"/>
+      </p:par>
+    </p:tnLst>
+  </p:timing>
+</p:sld>
+</file>
+
+<file path=ppt/slides/slide8.xml><?xml version="1.0" encoding="utf-8"?>
+<p:sld xmlns:a="http://schemas.openxmlformats.org/drawingml/2006/main" xmlns:r="http://schemas.openxmlformats.org/officeDocument/2006/relationships" xmlns:p="http://schemas.openxmlformats.org/presentationml/2006/main">
+  <p:cSld>
+    <p:spTree>
+      <p:nvGrpSpPr>
+        <p:cNvPr id="1" name=""/>
+        <p:cNvGrpSpPr/>
+        <p:nvPr/>
+      </p:nvGrpSpPr>
+      <p:grpSpPr>
+        <a:xfrm>
+          <a:off x="0" y="0"/>
+          <a:ext cx="0" cy="0"/>
+          <a:chOff x="0" y="0"/>
+          <a:chExt cx="0" cy="0"/>
+        </a:xfrm>
+      </p:grpSpPr>
+      <p:sp>
+        <p:nvSpPr>
+          <p:cNvPr id="29" name="Rounded Rectangle 28"/>
+          <p:cNvSpPr/>
+          <p:nvPr/>
+        </p:nvSpPr>
+        <p:spPr>
+          <a:xfrm>
+            <a:off x="3317241" y="1911983"/>
+            <a:ext cx="5648960" cy="2701291"/>
+          </a:xfrm>
+          <a:prstGeom prst="roundRect">
+            <a:avLst/>
+          </a:prstGeom>
+          <a:solidFill>
+            <a:schemeClr val="accent2">
+              <a:lumMod val="60000"/>
+              <a:lumOff val="40000"/>
+            </a:schemeClr>
+          </a:solidFill>
         </p:spPr>
         <p:style>
           <a:lnRef idx="2">
@@ -6068,24 +6948,20 @@
           <a:lstStyle/>
           <a:p>
             <a:pPr algn="ctr"/>
-            <a:r>
-              <a:rPr lang="en-US" dirty="0" smtClean="0"/>
-              <a:t>Initial Graph</a:t>
-            </a:r>
-            <a:endParaRPr lang="en-US" dirty="0"/>
-          </a:p>
-        </p:txBody>
-      </p:sp>
-      <p:sp>
-        <p:nvSpPr>
-          <p:cNvPr id="3" name="Rectangle 2"/>
+            <a:endParaRPr lang="en-US"/>
+          </a:p>
+        </p:txBody>
+      </p:sp>
+      <p:sp>
+        <p:nvSpPr>
+          <p:cNvPr id="2" name="Rectangle 1"/>
           <p:cNvSpPr/>
           <p:nvPr/>
         </p:nvSpPr>
         <p:spPr>
           <a:xfrm>
-            <a:off x="9220200" y="355600"/>
-            <a:ext cx="914400" cy="914400"/>
+            <a:off x="223520" y="355600"/>
+            <a:ext cx="1635760" cy="914400"/>
           </a:xfrm>
           <a:prstGeom prst="rect">
             <a:avLst/>
@@ -6113,23 +6989,23 @@
           <a:p>
             <a:pPr algn="ctr"/>
             <a:r>
-              <a:rPr lang="en-US" dirty="0" smtClean="0"/>
-              <a:t>EM</a:t>
-            </a:r>
-            <a:endParaRPr lang="en-US" dirty="0"/>
-          </a:p>
-        </p:txBody>
-      </p:sp>
-      <p:sp>
-        <p:nvSpPr>
-          <p:cNvPr id="4" name="Rectangle 3"/>
+              <a:rPr lang="en-US" sz="2000" b="1" dirty="0" smtClean="0"/>
+              <a:t>Initial Graph</a:t>
+            </a:r>
+            <a:endParaRPr lang="en-US" sz="2000" b="1" dirty="0"/>
+          </a:p>
+        </p:txBody>
+      </p:sp>
+      <p:sp>
+        <p:nvSpPr>
+          <p:cNvPr id="3" name="Rectangle 2"/>
           <p:cNvSpPr/>
           <p:nvPr/>
         </p:nvSpPr>
         <p:spPr>
           <a:xfrm>
-            <a:off x="1788160" y="4584700"/>
-            <a:ext cx="1422400" cy="914400"/>
+            <a:off x="9220200" y="355600"/>
+            <a:ext cx="914400" cy="914400"/>
           </a:xfrm>
           <a:prstGeom prst="rect">
             <a:avLst/>
@@ -6157,23 +7033,23 @@
           <a:p>
             <a:pPr algn="ctr"/>
             <a:r>
-              <a:rPr lang="en-US" dirty="0" smtClean="0"/>
-              <a:t>RF Ranking</a:t>
-            </a:r>
-            <a:endParaRPr lang="en-US" dirty="0"/>
-          </a:p>
-        </p:txBody>
-      </p:sp>
-      <p:sp>
-        <p:nvSpPr>
-          <p:cNvPr id="5" name="Rectangle 4"/>
+              <a:rPr lang="en-US" sz="2000" b="1" dirty="0" smtClean="0"/>
+              <a:t>EM</a:t>
+            </a:r>
+            <a:endParaRPr lang="en-US" sz="2000" b="1" dirty="0"/>
+          </a:p>
+        </p:txBody>
+      </p:sp>
+      <p:sp>
+        <p:nvSpPr>
+          <p:cNvPr id="11" name="Rectangle 10"/>
           <p:cNvSpPr/>
           <p:nvPr/>
         </p:nvSpPr>
         <p:spPr>
           <a:xfrm>
-            <a:off x="2042160" y="2246630"/>
-            <a:ext cx="914400" cy="914400"/>
+            <a:off x="3789680" y="355600"/>
+            <a:ext cx="1635760" cy="914400"/>
           </a:xfrm>
           <a:prstGeom prst="rect">
             <a:avLst/>
@@ -6201,23 +7077,301 @@
           <a:p>
             <a:pPr algn="ctr"/>
             <a:r>
-              <a:rPr lang="en-US" dirty="0" smtClean="0"/>
-              <a:t>Graph Update</a:t>
-            </a:r>
-            <a:endParaRPr lang="en-US" dirty="0"/>
-          </a:p>
-        </p:txBody>
-      </p:sp>
-      <p:sp>
-        <p:nvSpPr>
-          <p:cNvPr id="6" name="Rectangle 5"/>
+              <a:rPr lang="en-US" sz="2000" b="1" dirty="0" smtClean="0"/>
+              <a:t>Current Graph</a:t>
+            </a:r>
+            <a:endParaRPr lang="en-US" sz="2000" b="1" dirty="0"/>
+          </a:p>
+        </p:txBody>
+      </p:sp>
+      <p:cxnSp>
+        <p:nvCxnSpPr>
+          <p:cNvPr id="15" name="Straight Arrow Connector 14"/>
+          <p:cNvCxnSpPr>
+            <a:stCxn id="2" idx="3"/>
+            <a:endCxn id="11" idx="1"/>
+          </p:cNvCxnSpPr>
+          <p:nvPr/>
+        </p:nvCxnSpPr>
+        <p:spPr>
+          <a:xfrm>
+            <a:off x="1859280" y="812800"/>
+            <a:ext cx="1930400" cy="0"/>
+          </a:xfrm>
+          <a:prstGeom prst="straightConnector1">
+            <a:avLst/>
+          </a:prstGeom>
+          <a:ln w="38100">
+            <a:tailEnd type="triangle"/>
+          </a:ln>
+        </p:spPr>
+        <p:style>
+          <a:lnRef idx="3">
+            <a:schemeClr val="dk1"/>
+          </a:lnRef>
+          <a:fillRef idx="0">
+            <a:schemeClr val="dk1"/>
+          </a:fillRef>
+          <a:effectRef idx="2">
+            <a:schemeClr val="dk1"/>
+          </a:effectRef>
+          <a:fontRef idx="minor">
+            <a:schemeClr val="tx1"/>
+          </a:fontRef>
+        </p:style>
+      </p:cxnSp>
+      <p:cxnSp>
+        <p:nvCxnSpPr>
+          <p:cNvPr id="19" name="Straight Arrow Connector 18"/>
+          <p:cNvCxnSpPr>
+            <a:stCxn id="11" idx="3"/>
+            <a:endCxn id="3" idx="1"/>
+          </p:cNvCxnSpPr>
+          <p:nvPr/>
+        </p:nvCxnSpPr>
+        <p:spPr>
+          <a:xfrm>
+            <a:off x="5425440" y="812800"/>
+            <a:ext cx="3794760" cy="0"/>
+          </a:xfrm>
+          <a:prstGeom prst="straightConnector1">
+            <a:avLst/>
+          </a:prstGeom>
+          <a:ln w="38100">
+            <a:tailEnd type="triangle"/>
+          </a:ln>
+        </p:spPr>
+        <p:style>
+          <a:lnRef idx="3">
+            <a:schemeClr val="dk1"/>
+          </a:lnRef>
+          <a:fillRef idx="0">
+            <a:schemeClr val="dk1"/>
+          </a:fillRef>
+          <a:effectRef idx="2">
+            <a:schemeClr val="dk1"/>
+          </a:effectRef>
+          <a:fontRef idx="minor">
+            <a:schemeClr val="tx1"/>
+          </a:fontRef>
+        </p:style>
+      </p:cxnSp>
+      <p:graphicFrame>
+        <p:nvGraphicFramePr>
+          <p:cNvPr id="53" name="Object 52"/>
+          <p:cNvGraphicFramePr>
+            <a:graphicFrameLocks noChangeAspect="1"/>
+          </p:cNvGraphicFramePr>
+          <p:nvPr>
+            <p:extLst>
+              <p:ext uri="{D42A27DB-BD31-4B8C-83A1-F6EECF244321}">
+                <p14:modId xmlns:p14="http://schemas.microsoft.com/office/powerpoint/2010/main" val="3503558538"/>
+              </p:ext>
+            </p:extLst>
+          </p:nvPr>
+        </p:nvGraphicFramePr>
+        <p:xfrm>
+          <a:off x="2409009" y="297807"/>
+          <a:ext cx="801551" cy="582946"/>
+        </p:xfrm>
+        <a:graphic>
+          <a:graphicData uri="http://schemas.openxmlformats.org/presentationml/2006/ole">
+            <mc:AlternateContent xmlns:mc="http://schemas.openxmlformats.org/markup-compatibility/2006">
+              <mc:Choice xmlns:v="urn:schemas-microsoft-com:vml" Requires="v">
+                <p:oleObj spid="_x0000_s5154" name="Equation" r:id="rId3" imgW="279360" imgH="203040" progId="Equation.DSMT4">
+                  <p:embed/>
+                </p:oleObj>
+              </mc:Choice>
+              <mc:Fallback>
+                <p:oleObj name="Equation" r:id="rId3" imgW="279360" imgH="203040" progId="Equation.DSMT4">
+                  <p:embed/>
+                  <p:pic>
+                    <p:nvPicPr>
+                      <p:cNvPr id="0" name=""/>
+                      <p:cNvPicPr/>
+                      <p:nvPr/>
+                    </p:nvPicPr>
+                    <p:blipFill>
+                      <a:blip r:embed="rId4"/>
+                      <a:stretch>
+                        <a:fillRect/>
+                      </a:stretch>
+                    </p:blipFill>
+                    <p:spPr>
+                      <a:xfrm>
+                        <a:off x="2409009" y="297807"/>
+                        <a:ext cx="801551" cy="582946"/>
+                      </a:xfrm>
+                      <a:prstGeom prst="rect">
+                        <a:avLst/>
+                      </a:prstGeom>
+                    </p:spPr>
+                  </p:pic>
+                </p:oleObj>
+              </mc:Fallback>
+            </mc:AlternateContent>
+          </a:graphicData>
+        </a:graphic>
+      </p:graphicFrame>
+      <p:graphicFrame>
+        <p:nvGraphicFramePr>
+          <p:cNvPr id="55" name="Object 54"/>
+          <p:cNvGraphicFramePr>
+            <a:graphicFrameLocks noChangeAspect="1"/>
+          </p:cNvGraphicFramePr>
+          <p:nvPr>
+            <p:extLst>
+              <p:ext uri="{D42A27DB-BD31-4B8C-83A1-F6EECF244321}">
+                <p14:modId xmlns:p14="http://schemas.microsoft.com/office/powerpoint/2010/main" val="3773982871"/>
+              </p:ext>
+            </p:extLst>
+          </p:nvPr>
+        </p:nvGraphicFramePr>
+        <p:xfrm>
+          <a:off x="6661150" y="230188"/>
+          <a:ext cx="800100" cy="582612"/>
+        </p:xfrm>
+        <a:graphic>
+          <a:graphicData uri="http://schemas.openxmlformats.org/presentationml/2006/ole">
+            <mc:AlternateContent xmlns:mc="http://schemas.openxmlformats.org/markup-compatibility/2006">
+              <mc:Choice xmlns:v="urn:schemas-microsoft-com:vml" Requires="v">
+                <p:oleObj spid="_x0000_s5155" name="Equation" r:id="rId5" imgW="279360" imgH="203040" progId="Equation.DSMT4">
+                  <p:embed/>
+                </p:oleObj>
+              </mc:Choice>
+              <mc:Fallback>
+                <p:oleObj name="Equation" r:id="rId5" imgW="279360" imgH="203040" progId="Equation.DSMT4">
+                  <p:embed/>
+                  <p:pic>
+                    <p:nvPicPr>
+                      <p:cNvPr id="0" name=""/>
+                      <p:cNvPicPr/>
+                      <p:nvPr/>
+                    </p:nvPicPr>
+                    <p:blipFill>
+                      <a:blip r:embed="rId6"/>
+                      <a:stretch>
+                        <a:fillRect/>
+                      </a:stretch>
+                    </p:blipFill>
+                    <p:spPr>
+                      <a:xfrm>
+                        <a:off x="6661150" y="230188"/>
+                        <a:ext cx="800100" cy="582612"/>
+                      </a:xfrm>
+                      <a:prstGeom prst="rect">
+                        <a:avLst/>
+                      </a:prstGeom>
+                    </p:spPr>
+                  </p:pic>
+                </p:oleObj>
+              </mc:Fallback>
+            </mc:AlternateContent>
+          </a:graphicData>
+        </a:graphic>
+      </p:graphicFrame>
+      <p:cxnSp>
+        <p:nvCxnSpPr>
+          <p:cNvPr id="58" name="Straight Arrow Connector 57"/>
+          <p:cNvCxnSpPr>
+            <a:stCxn id="3" idx="3"/>
+          </p:cNvCxnSpPr>
+          <p:nvPr/>
+        </p:nvCxnSpPr>
+        <p:spPr>
+          <a:xfrm>
+            <a:off x="10134600" y="812800"/>
+            <a:ext cx="1783080" cy="0"/>
+          </a:xfrm>
+          <a:prstGeom prst="straightConnector1">
+            <a:avLst/>
+          </a:prstGeom>
+          <a:ln w="38100">
+            <a:tailEnd type="triangle"/>
+          </a:ln>
+        </p:spPr>
+        <p:style>
+          <a:lnRef idx="3">
+            <a:schemeClr val="dk1"/>
+          </a:lnRef>
+          <a:fillRef idx="0">
+            <a:schemeClr val="dk1"/>
+          </a:fillRef>
+          <a:effectRef idx="2">
+            <a:schemeClr val="dk1"/>
+          </a:effectRef>
+          <a:fontRef idx="minor">
+            <a:schemeClr val="tx1"/>
+          </a:fontRef>
+        </p:style>
+      </p:cxnSp>
+      <p:graphicFrame>
+        <p:nvGraphicFramePr>
+          <p:cNvPr id="59" name="Object 58"/>
+          <p:cNvGraphicFramePr>
+            <a:graphicFrameLocks noChangeAspect="1"/>
+          </p:cNvGraphicFramePr>
+          <p:nvPr>
+            <p:extLst>
+              <p:ext uri="{D42A27DB-BD31-4B8C-83A1-F6EECF244321}">
+                <p14:modId xmlns:p14="http://schemas.microsoft.com/office/powerpoint/2010/main" val="1963695085"/>
+              </p:ext>
+            </p:extLst>
+          </p:nvPr>
+        </p:nvGraphicFramePr>
+        <p:xfrm>
+          <a:off x="10759440" y="272831"/>
+          <a:ext cx="825500" cy="512380"/>
+        </p:xfrm>
+        <a:graphic>
+          <a:graphicData uri="http://schemas.openxmlformats.org/presentationml/2006/ole">
+            <mc:AlternateContent xmlns:mc="http://schemas.openxmlformats.org/markup-compatibility/2006">
+              <mc:Choice xmlns:v="urn:schemas-microsoft-com:vml" Requires="v">
+                <p:oleObj spid="_x0000_s5156" name="Equation" r:id="rId7" imgW="368280" imgH="228600" progId="Equation.DSMT4">
+                  <p:embed/>
+                </p:oleObj>
+              </mc:Choice>
+              <mc:Fallback>
+                <p:oleObj name="Equation" r:id="rId7" imgW="368280" imgH="228600" progId="Equation.DSMT4">
+                  <p:embed/>
+                  <p:pic>
+                    <p:nvPicPr>
+                      <p:cNvPr id="0" name=""/>
+                      <p:cNvPicPr/>
+                      <p:nvPr/>
+                    </p:nvPicPr>
+                    <p:blipFill>
+                      <a:blip r:embed="rId8"/>
+                      <a:stretch>
+                        <a:fillRect/>
+                      </a:stretch>
+                    </p:blipFill>
+                    <p:spPr>
+                      <a:xfrm>
+                        <a:off x="10759440" y="272831"/>
+                        <a:ext cx="825500" cy="512380"/>
+                      </a:xfrm>
+                      <a:prstGeom prst="rect">
+                        <a:avLst/>
+                      </a:prstGeom>
+                    </p:spPr>
+                  </p:pic>
+                </p:oleObj>
+              </mc:Fallback>
+            </mc:AlternateContent>
+          </a:graphicData>
+        </a:graphic>
+      </p:graphicFrame>
+      <p:sp>
+        <p:nvSpPr>
+          <p:cNvPr id="60" name="Rectangle 59"/>
           <p:cNvSpPr/>
           <p:nvPr/>
         </p:nvSpPr>
         <p:spPr>
           <a:xfrm>
-            <a:off x="6766560" y="1737360"/>
-            <a:ext cx="914400" cy="914400"/>
+            <a:off x="5999481" y="2805428"/>
+            <a:ext cx="2132330" cy="914400"/>
           </a:xfrm>
           <a:prstGeom prst="rect">
             <a:avLst/>
@@ -6245,22 +7399,23 @@
           <a:p>
             <a:pPr algn="ctr"/>
             <a:r>
-              <a:rPr lang="en-US" dirty="0" smtClean="0"/>
-              <a:t>Prior</a:t>
-            </a:r>
-          </a:p>
-        </p:txBody>
-      </p:sp>
-      <p:sp>
-        <p:nvSpPr>
-          <p:cNvPr id="11" name="Rectangle 10"/>
+              <a:rPr lang="en-US" sz="2000" b="1" dirty="0" smtClean="0"/>
+              <a:t>Predict mislabeled tasks</a:t>
+            </a:r>
+            <a:endParaRPr lang="en-US" sz="2000" b="1" dirty="0"/>
+          </a:p>
+        </p:txBody>
+      </p:sp>
+      <p:sp>
+        <p:nvSpPr>
+          <p:cNvPr id="61" name="Rectangle 60"/>
           <p:cNvSpPr/>
           <p:nvPr/>
         </p:nvSpPr>
         <p:spPr>
           <a:xfrm>
-            <a:off x="3789680" y="355600"/>
-            <a:ext cx="1635760" cy="914400"/>
+            <a:off x="3931920" y="2805428"/>
+            <a:ext cx="1361440" cy="914400"/>
           </a:xfrm>
           <a:prstGeom prst="rect">
             <a:avLst/>
@@ -6288,27 +7443,225 @@
           <a:p>
             <a:pPr algn="ctr"/>
             <a:r>
-              <a:rPr lang="en-US" dirty="0" smtClean="0"/>
-              <a:t>Current Graph</a:t>
-            </a:r>
-            <a:endParaRPr lang="en-US" dirty="0"/>
-          </a:p>
-        </p:txBody>
-      </p:sp>
-      <p:sp>
-        <p:nvSpPr>
-          <p:cNvPr id="12" name="Rectangle 11"/>
-          <p:cNvSpPr/>
+              <a:rPr lang="en-US" sz="2000" b="1" dirty="0" smtClean="0"/>
+              <a:t>Add edges </a:t>
+            </a:r>
+            <a:endParaRPr lang="en-US" sz="2000" b="1" dirty="0"/>
+          </a:p>
+        </p:txBody>
+      </p:sp>
+      <p:cxnSp>
+        <p:nvCxnSpPr>
+          <p:cNvPr id="62" name="Elbow Connector 61"/>
+          <p:cNvCxnSpPr>
+            <a:stCxn id="3" idx="2"/>
+            <a:endCxn id="60" idx="3"/>
+          </p:cNvCxnSpPr>
           <p:nvPr/>
-        </p:nvSpPr>
-        <p:spPr>
-          <a:xfrm>
-            <a:off x="3789680" y="1737360"/>
-            <a:ext cx="1635760" cy="914400"/>
+        </p:nvCxnSpPr>
+        <p:spPr>
+          <a:xfrm rot="5400000">
+            <a:off x="7908292" y="1493520"/>
+            <a:ext cx="1992628" cy="1545589"/>
+          </a:xfrm>
+          <a:prstGeom prst="bentConnector2">
+            <a:avLst/>
+          </a:prstGeom>
+          <a:ln w="38100">
+            <a:tailEnd type="triangle"/>
+          </a:ln>
+        </p:spPr>
+        <p:style>
+          <a:lnRef idx="3">
+            <a:schemeClr val="dk1"/>
+          </a:lnRef>
+          <a:fillRef idx="0">
+            <a:schemeClr val="dk1"/>
+          </a:fillRef>
+          <a:effectRef idx="2">
+            <a:schemeClr val="dk1"/>
+          </a:effectRef>
+          <a:fontRef idx="minor">
+            <a:schemeClr val="tx1"/>
+          </a:fontRef>
+        </p:style>
+      </p:cxnSp>
+      <p:cxnSp>
+        <p:nvCxnSpPr>
+          <p:cNvPr id="68" name="Straight Arrow Connector 67"/>
+          <p:cNvCxnSpPr>
+            <a:stCxn id="61" idx="0"/>
+            <a:endCxn id="11" idx="2"/>
+          </p:cNvCxnSpPr>
+          <p:nvPr/>
+        </p:nvCxnSpPr>
+        <p:spPr>
+          <a:xfrm flipH="1" flipV="1">
+            <a:off x="4607560" y="1270000"/>
+            <a:ext cx="5080" cy="1535428"/>
+          </a:xfrm>
+          <a:prstGeom prst="straightConnector1">
+            <a:avLst/>
+          </a:prstGeom>
+          <a:ln w="38100">
+            <a:tailEnd type="triangle"/>
+          </a:ln>
+        </p:spPr>
+        <p:style>
+          <a:lnRef idx="3">
+            <a:schemeClr val="dk1"/>
+          </a:lnRef>
+          <a:fillRef idx="0">
+            <a:schemeClr val="dk1"/>
+          </a:fillRef>
+          <a:effectRef idx="2">
+            <a:schemeClr val="dk1"/>
+          </a:effectRef>
+          <a:fontRef idx="minor">
+            <a:schemeClr val="tx1"/>
+          </a:fontRef>
+        </p:style>
+      </p:cxnSp>
+      <p:cxnSp>
+        <p:nvCxnSpPr>
+          <p:cNvPr id="73" name="Straight Arrow Connector 72"/>
+          <p:cNvCxnSpPr>
+            <a:endCxn id="61" idx="3"/>
+          </p:cNvCxnSpPr>
+          <p:nvPr/>
+        </p:nvCxnSpPr>
+        <p:spPr>
+          <a:xfrm flipH="1">
+            <a:off x="5293360" y="3262628"/>
+            <a:ext cx="704215" cy="0"/>
+          </a:xfrm>
+          <a:prstGeom prst="straightConnector1">
+            <a:avLst/>
+          </a:prstGeom>
+          <a:ln w="38100">
+            <a:tailEnd type="triangle"/>
+          </a:ln>
+        </p:spPr>
+        <p:style>
+          <a:lnRef idx="3">
+            <a:schemeClr val="dk1"/>
+          </a:lnRef>
+          <a:fillRef idx="0">
+            <a:schemeClr val="dk1"/>
+          </a:fillRef>
+          <a:effectRef idx="2">
+            <a:schemeClr val="dk1"/>
+          </a:effectRef>
+          <a:fontRef idx="minor">
+            <a:schemeClr val="tx1"/>
+          </a:fontRef>
+        </p:style>
+      </p:cxnSp>
+      <p:sp>
+        <p:nvSpPr>
+          <p:cNvPr id="74" name="Title 1"/>
+          <p:cNvSpPr txBox="1">
+            <a:spLocks/>
+          </p:cNvSpPr>
+          <p:nvPr/>
+        </p:nvSpPr>
+        <p:spPr>
+          <a:xfrm>
+            <a:off x="883921" y="5506719"/>
+            <a:ext cx="10515600" cy="1325563"/>
           </a:xfrm>
           <a:prstGeom prst="rect">
             <a:avLst/>
           </a:prstGeom>
+        </p:spPr>
+        <p:txBody>
+          <a:bodyPr/>
+          <a:lstStyle>
+            <a:lvl1pPr algn="l" defTabSz="914400" rtl="0" eaLnBrk="1" latinLnBrk="0" hangingPunct="1">
+              <a:lnSpc>
+                <a:spcPct val="90000"/>
+              </a:lnSpc>
+              <a:spcBef>
+                <a:spcPct val="0"/>
+              </a:spcBef>
+              <a:buNone/>
+              <a:defRPr sz="4400" kern="1200">
+                <a:solidFill>
+                  <a:schemeClr val="tx1"/>
+                </a:solidFill>
+                <a:latin typeface="+mj-lt"/>
+                <a:ea typeface="+mj-ea"/>
+                <a:cs typeface="+mj-cs"/>
+              </a:defRPr>
+            </a:lvl1pPr>
+          </a:lstStyle>
+          <a:p>
+            <a:pPr algn="ctr"/>
+            <a:r>
+              <a:rPr lang="en-US" b="1" dirty="0" smtClean="0"/>
+              <a:t>Graph Adaptivity at a Glance </a:t>
+            </a:r>
+            <a:endParaRPr lang="en-US" b="1" dirty="0"/>
+          </a:p>
+        </p:txBody>
+      </p:sp>
+    </p:spTree>
+    <p:extLst>
+      <p:ext uri="{BB962C8B-B14F-4D97-AF65-F5344CB8AC3E}">
+        <p14:creationId xmlns:p14="http://schemas.microsoft.com/office/powerpoint/2010/main" val="4170288084"/>
+      </p:ext>
+    </p:extLst>
+  </p:cSld>
+  <p:clrMapOvr>
+    <a:masterClrMapping/>
+  </p:clrMapOvr>
+  <p:timing>
+    <p:tnLst>
+      <p:par>
+        <p:cTn id="1" dur="indefinite" restart="never" nodeType="tmRoot"/>
+      </p:par>
+    </p:tnLst>
+  </p:timing>
+</p:sld>
+</file>
+
+<file path=ppt/slides/slide9.xml><?xml version="1.0" encoding="utf-8"?>
+<p:sld xmlns:a="http://schemas.openxmlformats.org/drawingml/2006/main" xmlns:r="http://schemas.openxmlformats.org/officeDocument/2006/relationships" xmlns:p="http://schemas.openxmlformats.org/presentationml/2006/main">
+  <p:cSld>
+    <p:spTree>
+      <p:nvGrpSpPr>
+        <p:cNvPr id="1" name=""/>
+        <p:cNvGrpSpPr/>
+        <p:nvPr/>
+      </p:nvGrpSpPr>
+      <p:grpSpPr>
+        <a:xfrm>
+          <a:off x="0" y="0"/>
+          <a:ext cx="0" cy="0"/>
+          <a:chOff x="0" y="0"/>
+          <a:chExt cx="0" cy="0"/>
+        </a:xfrm>
+      </p:grpSpPr>
+      <p:sp>
+        <p:nvSpPr>
+          <p:cNvPr id="29" name="Rounded Rectangle 28"/>
+          <p:cNvSpPr/>
+          <p:nvPr/>
+        </p:nvSpPr>
+        <p:spPr>
+          <a:xfrm>
+            <a:off x="763429" y="1554479"/>
+            <a:ext cx="9853771" cy="5110481"/>
+          </a:xfrm>
+          <a:prstGeom prst="roundRect">
+            <a:avLst/>
+          </a:prstGeom>
+          <a:solidFill>
+            <a:schemeClr val="accent2">
+              <a:lumMod val="60000"/>
+              <a:lumOff val="40000"/>
+            </a:schemeClr>
+          </a:solidFill>
         </p:spPr>
         <p:style>
           <a:lnRef idx="2">
@@ -6331,23 +7684,19 @@
           <a:lstStyle/>
           <a:p>
             <a:pPr algn="ctr"/>
-            <a:r>
-              <a:rPr lang="en-US" dirty="0" smtClean="0"/>
-              <a:t>Generate Random Data</a:t>
-            </a:r>
-            <a:endParaRPr lang="en-US" dirty="0"/>
-          </a:p>
-        </p:txBody>
-      </p:sp>
-      <p:sp>
-        <p:nvSpPr>
-          <p:cNvPr id="13" name="Rectangle 12"/>
+            <a:endParaRPr lang="en-US"/>
+          </a:p>
+        </p:txBody>
+      </p:sp>
+      <p:sp>
+        <p:nvSpPr>
+          <p:cNvPr id="2" name="Rectangle 1"/>
           <p:cNvSpPr/>
           <p:nvPr/>
         </p:nvSpPr>
         <p:spPr>
           <a:xfrm>
-            <a:off x="3789680" y="4584700"/>
+            <a:off x="223520" y="355600"/>
             <a:ext cx="1635760" cy="914400"/>
           </a:xfrm>
           <a:prstGeom prst="rect">
@@ -6376,201 +7725,22 @@
           <a:p>
             <a:pPr algn="ctr"/>
             <a:r>
-              <a:rPr lang="en-US" dirty="0" smtClean="0"/>
-              <a:t>Learn RF</a:t>
-            </a:r>
-          </a:p>
-        </p:txBody>
-      </p:sp>
-      <p:cxnSp>
-        <p:nvCxnSpPr>
-          <p:cNvPr id="15" name="Straight Arrow Connector 14"/>
-          <p:cNvCxnSpPr>
-            <a:stCxn id="2" idx="3"/>
-            <a:endCxn id="11" idx="1"/>
-          </p:cNvCxnSpPr>
-          <p:nvPr/>
-        </p:nvCxnSpPr>
-        <p:spPr>
-          <a:xfrm>
-            <a:off x="1859280" y="812800"/>
-            <a:ext cx="1930400" cy="0"/>
-          </a:xfrm>
-          <a:prstGeom prst="straightConnector1">
-            <a:avLst/>
-          </a:prstGeom>
-          <a:ln>
-            <a:tailEnd type="triangle"/>
-          </a:ln>
-        </p:spPr>
-        <p:style>
-          <a:lnRef idx="1">
-            <a:schemeClr val="accent1"/>
-          </a:lnRef>
-          <a:fillRef idx="0">
-            <a:schemeClr val="accent1"/>
-          </a:fillRef>
-          <a:effectRef idx="0">
-            <a:schemeClr val="accent1"/>
-          </a:effectRef>
-          <a:fontRef idx="minor">
-            <a:schemeClr val="tx1"/>
-          </a:fontRef>
-        </p:style>
-      </p:cxnSp>
-      <p:cxnSp>
-        <p:nvCxnSpPr>
-          <p:cNvPr id="19" name="Straight Arrow Connector 18"/>
-          <p:cNvCxnSpPr>
-            <a:stCxn id="11" idx="3"/>
-            <a:endCxn id="3" idx="1"/>
-          </p:cNvCxnSpPr>
-          <p:nvPr/>
-        </p:nvCxnSpPr>
-        <p:spPr>
-          <a:xfrm>
-            <a:off x="5425440" y="812800"/>
-            <a:ext cx="3794760" cy="0"/>
-          </a:xfrm>
-          <a:prstGeom prst="straightConnector1">
-            <a:avLst/>
-          </a:prstGeom>
-          <a:ln>
-            <a:tailEnd type="triangle"/>
-          </a:ln>
-        </p:spPr>
-        <p:style>
-          <a:lnRef idx="1">
-            <a:schemeClr val="accent1"/>
-          </a:lnRef>
-          <a:fillRef idx="0">
-            <a:schemeClr val="accent1"/>
-          </a:fillRef>
-          <a:effectRef idx="0">
-            <a:schemeClr val="accent1"/>
-          </a:effectRef>
-          <a:fontRef idx="minor">
-            <a:schemeClr val="tx1"/>
-          </a:fontRef>
-        </p:style>
-      </p:cxnSp>
-      <p:cxnSp>
-        <p:nvCxnSpPr>
-          <p:cNvPr id="21" name="Elbow Connector 20"/>
-          <p:cNvCxnSpPr>
-            <a:stCxn id="6" idx="3"/>
-            <a:endCxn id="3" idx="2"/>
-          </p:cNvCxnSpPr>
-          <p:nvPr/>
-        </p:nvCxnSpPr>
-        <p:spPr>
-          <a:xfrm flipV="1">
-            <a:off x="7680960" y="1270000"/>
-            <a:ext cx="1996440" cy="924560"/>
-          </a:xfrm>
-          <a:prstGeom prst="bentConnector2">
-            <a:avLst/>
-          </a:prstGeom>
-          <a:ln>
-            <a:tailEnd type="triangle"/>
-          </a:ln>
-        </p:spPr>
-        <p:style>
-          <a:lnRef idx="1">
-            <a:schemeClr val="accent1"/>
-          </a:lnRef>
-          <a:fillRef idx="0">
-            <a:schemeClr val="accent1"/>
-          </a:fillRef>
-          <a:effectRef idx="0">
-            <a:schemeClr val="accent1"/>
-          </a:effectRef>
-          <a:fontRef idx="minor">
-            <a:schemeClr val="tx1"/>
-          </a:fontRef>
-        </p:style>
-      </p:cxnSp>
-      <p:cxnSp>
-        <p:nvCxnSpPr>
-          <p:cNvPr id="23" name="Straight Arrow Connector 22"/>
-          <p:cNvCxnSpPr>
-            <a:stCxn id="6" idx="1"/>
-            <a:endCxn id="12" idx="3"/>
-          </p:cNvCxnSpPr>
-          <p:nvPr/>
-        </p:nvCxnSpPr>
-        <p:spPr>
-          <a:xfrm flipH="1">
-            <a:off x="5425440" y="2194560"/>
-            <a:ext cx="1341120" cy="0"/>
-          </a:xfrm>
-          <a:prstGeom prst="straightConnector1">
-            <a:avLst/>
-          </a:prstGeom>
-          <a:ln>
-            <a:tailEnd type="triangle"/>
-          </a:ln>
-        </p:spPr>
-        <p:style>
-          <a:lnRef idx="1">
-            <a:schemeClr val="accent1"/>
-          </a:lnRef>
-          <a:fillRef idx="0">
-            <a:schemeClr val="accent1"/>
-          </a:fillRef>
-          <a:effectRef idx="0">
-            <a:schemeClr val="accent1"/>
-          </a:effectRef>
-          <a:fontRef idx="minor">
-            <a:schemeClr val="tx1"/>
-          </a:fontRef>
-        </p:style>
-      </p:cxnSp>
-      <p:cxnSp>
-        <p:nvCxnSpPr>
-          <p:cNvPr id="26" name="Straight Arrow Connector 25"/>
-          <p:cNvCxnSpPr>
-            <a:stCxn id="11" idx="2"/>
-            <a:endCxn id="12" idx="0"/>
-          </p:cNvCxnSpPr>
-          <p:nvPr/>
-        </p:nvCxnSpPr>
-        <p:spPr>
-          <a:xfrm>
-            <a:off x="4607560" y="1270000"/>
-            <a:ext cx="0" cy="467360"/>
-          </a:xfrm>
-          <a:prstGeom prst="straightConnector1">
-            <a:avLst/>
-          </a:prstGeom>
-          <a:ln>
-            <a:tailEnd type="triangle"/>
-          </a:ln>
-        </p:spPr>
-        <p:style>
-          <a:lnRef idx="1">
-            <a:schemeClr val="accent1"/>
-          </a:lnRef>
-          <a:fillRef idx="0">
-            <a:schemeClr val="accent1"/>
-          </a:fillRef>
-          <a:effectRef idx="0">
-            <a:schemeClr val="accent1"/>
-          </a:effectRef>
-          <a:fontRef idx="minor">
-            <a:schemeClr val="tx1"/>
-          </a:fontRef>
-        </p:style>
-      </p:cxnSp>
-      <p:sp>
-        <p:nvSpPr>
-          <p:cNvPr id="38" name="Rectangle 37"/>
+              <a:rPr lang="en-US" sz="2000" b="1" dirty="0" smtClean="0"/>
+              <a:t>Initial Graph</a:t>
+            </a:r>
+            <a:endParaRPr lang="en-US" sz="2000" b="1" dirty="0"/>
+          </a:p>
+        </p:txBody>
+      </p:sp>
+      <p:sp>
+        <p:nvSpPr>
+          <p:cNvPr id="3" name="Rectangle 2"/>
           <p:cNvSpPr/>
           <p:nvPr/>
         </p:nvSpPr>
         <p:spPr>
           <a:xfrm>
-            <a:off x="4150360" y="3161030"/>
+            <a:off x="9220200" y="355600"/>
             <a:ext cx="914400" cy="914400"/>
           </a:xfrm>
           <a:prstGeom prst="rect">
@@ -6599,10 +7769,424 @@
           <a:p>
             <a:pPr algn="ctr"/>
             <a:r>
-              <a:rPr lang="en-US" dirty="0" smtClean="0"/>
+              <a:rPr lang="en-US" sz="2000" b="1" dirty="0" smtClean="0"/>
               <a:t>EM</a:t>
             </a:r>
-            <a:endParaRPr lang="en-US" dirty="0"/>
+            <a:endParaRPr lang="en-US" sz="2000" b="1" dirty="0"/>
+          </a:p>
+        </p:txBody>
+      </p:sp>
+      <p:sp>
+        <p:nvSpPr>
+          <p:cNvPr id="4" name="Rectangle 3"/>
+          <p:cNvSpPr/>
+          <p:nvPr/>
+        </p:nvSpPr>
+        <p:spPr>
+          <a:xfrm>
+            <a:off x="1849120" y="5133340"/>
+            <a:ext cx="1422400" cy="914400"/>
+          </a:xfrm>
+          <a:prstGeom prst="rect">
+            <a:avLst/>
+          </a:prstGeom>
+        </p:spPr>
+        <p:style>
+          <a:lnRef idx="2">
+            <a:schemeClr val="accent1">
+              <a:shade val="50000"/>
+            </a:schemeClr>
+          </a:lnRef>
+          <a:fillRef idx="1">
+            <a:schemeClr val="accent1"/>
+          </a:fillRef>
+          <a:effectRef idx="0">
+            <a:schemeClr val="accent1"/>
+          </a:effectRef>
+          <a:fontRef idx="minor">
+            <a:schemeClr val="lt1"/>
+          </a:fontRef>
+        </p:style>
+        <p:txBody>
+          <a:bodyPr rtlCol="0" anchor="ctr"/>
+          <a:lstStyle/>
+          <a:p>
+            <a:pPr algn="ctr"/>
+            <a:r>
+              <a:rPr lang="en-US" sz="2000" b="1" dirty="0" smtClean="0"/>
+              <a:t>Rank Tasks</a:t>
+            </a:r>
+            <a:endParaRPr lang="en-US" sz="2000" b="1" dirty="0"/>
+          </a:p>
+        </p:txBody>
+      </p:sp>
+      <p:sp>
+        <p:nvSpPr>
+          <p:cNvPr id="5" name="Rectangle 4"/>
+          <p:cNvSpPr/>
+          <p:nvPr/>
+        </p:nvSpPr>
+        <p:spPr>
+          <a:xfrm>
+            <a:off x="2042160" y="2663190"/>
+            <a:ext cx="1036320" cy="914400"/>
+          </a:xfrm>
+          <a:prstGeom prst="rect">
+            <a:avLst/>
+          </a:prstGeom>
+        </p:spPr>
+        <p:style>
+          <a:lnRef idx="2">
+            <a:schemeClr val="accent1">
+              <a:shade val="50000"/>
+            </a:schemeClr>
+          </a:lnRef>
+          <a:fillRef idx="1">
+            <a:schemeClr val="accent1"/>
+          </a:fillRef>
+          <a:effectRef idx="0">
+            <a:schemeClr val="accent1"/>
+          </a:effectRef>
+          <a:fontRef idx="minor">
+            <a:schemeClr val="lt1"/>
+          </a:fontRef>
+        </p:style>
+        <p:txBody>
+          <a:bodyPr rtlCol="0" anchor="ctr"/>
+          <a:lstStyle/>
+          <a:p>
+            <a:pPr algn="ctr"/>
+            <a:r>
+              <a:rPr lang="en-US" sz="2000" b="1" dirty="0" smtClean="0"/>
+              <a:t>Graph Update</a:t>
+            </a:r>
+            <a:endParaRPr lang="en-US" sz="2000" b="1" dirty="0"/>
+          </a:p>
+        </p:txBody>
+      </p:sp>
+      <p:sp>
+        <p:nvSpPr>
+          <p:cNvPr id="6" name="Rectangle 5"/>
+          <p:cNvSpPr/>
+          <p:nvPr/>
+        </p:nvSpPr>
+        <p:spPr>
+          <a:xfrm>
+            <a:off x="7721600" y="1692093"/>
+            <a:ext cx="914400" cy="914400"/>
+          </a:xfrm>
+          <a:prstGeom prst="rect">
+            <a:avLst/>
+          </a:prstGeom>
+        </p:spPr>
+        <p:style>
+          <a:lnRef idx="2">
+            <a:schemeClr val="accent1">
+              <a:shade val="50000"/>
+            </a:schemeClr>
+          </a:lnRef>
+          <a:fillRef idx="1">
+            <a:schemeClr val="accent1"/>
+          </a:fillRef>
+          <a:effectRef idx="0">
+            <a:schemeClr val="accent1"/>
+          </a:effectRef>
+          <a:fontRef idx="minor">
+            <a:schemeClr val="lt1"/>
+          </a:fontRef>
+        </p:style>
+        <p:txBody>
+          <a:bodyPr rtlCol="0" anchor="ctr"/>
+          <a:lstStyle/>
+          <a:p>
+            <a:pPr algn="ctr"/>
+            <a:r>
+              <a:rPr lang="en-US" sz="2000" b="1" dirty="0" smtClean="0"/>
+              <a:t>Prior</a:t>
+            </a:r>
+          </a:p>
+        </p:txBody>
+      </p:sp>
+      <p:sp>
+        <p:nvSpPr>
+          <p:cNvPr id="11" name="Rectangle 10"/>
+          <p:cNvSpPr/>
+          <p:nvPr/>
+        </p:nvSpPr>
+        <p:spPr>
+          <a:xfrm>
+            <a:off x="3789680" y="355600"/>
+            <a:ext cx="1635760" cy="914400"/>
+          </a:xfrm>
+          <a:prstGeom prst="rect">
+            <a:avLst/>
+          </a:prstGeom>
+        </p:spPr>
+        <p:style>
+          <a:lnRef idx="2">
+            <a:schemeClr val="accent1">
+              <a:shade val="50000"/>
+            </a:schemeClr>
+          </a:lnRef>
+          <a:fillRef idx="1">
+            <a:schemeClr val="accent1"/>
+          </a:fillRef>
+          <a:effectRef idx="0">
+            <a:schemeClr val="accent1"/>
+          </a:effectRef>
+          <a:fontRef idx="minor">
+            <a:schemeClr val="lt1"/>
+          </a:fontRef>
+        </p:style>
+        <p:txBody>
+          <a:bodyPr rtlCol="0" anchor="ctr"/>
+          <a:lstStyle/>
+          <a:p>
+            <a:pPr algn="ctr"/>
+            <a:r>
+              <a:rPr lang="en-US" sz="2000" b="1" dirty="0" smtClean="0"/>
+              <a:t>Current Graph</a:t>
+            </a:r>
+            <a:endParaRPr lang="en-US" sz="2000" b="1" dirty="0"/>
+          </a:p>
+        </p:txBody>
+      </p:sp>
+      <p:sp>
+        <p:nvSpPr>
+          <p:cNvPr id="12" name="Rectangle 11"/>
+          <p:cNvSpPr/>
+          <p:nvPr/>
+        </p:nvSpPr>
+        <p:spPr>
+          <a:xfrm>
+            <a:off x="5025390" y="1692093"/>
+            <a:ext cx="1635760" cy="914400"/>
+          </a:xfrm>
+          <a:prstGeom prst="rect">
+            <a:avLst/>
+          </a:prstGeom>
+        </p:spPr>
+        <p:style>
+          <a:lnRef idx="2">
+            <a:schemeClr val="accent1">
+              <a:shade val="50000"/>
+            </a:schemeClr>
+          </a:lnRef>
+          <a:fillRef idx="1">
+            <a:schemeClr val="accent1"/>
+          </a:fillRef>
+          <a:effectRef idx="0">
+            <a:schemeClr val="accent1"/>
+          </a:effectRef>
+          <a:fontRef idx="minor">
+            <a:schemeClr val="lt1"/>
+          </a:fontRef>
+        </p:style>
+        <p:txBody>
+          <a:bodyPr rtlCol="0" anchor="ctr"/>
+          <a:lstStyle/>
+          <a:p>
+            <a:pPr algn="ctr"/>
+            <a:r>
+              <a:rPr lang="en-US" sz="2000" b="1" dirty="0" smtClean="0"/>
+              <a:t>Generate Random Data</a:t>
+            </a:r>
+            <a:endParaRPr lang="en-US" sz="2000" b="1" dirty="0"/>
+          </a:p>
+        </p:txBody>
+      </p:sp>
+      <p:sp>
+        <p:nvSpPr>
+          <p:cNvPr id="13" name="Rectangle 12"/>
+          <p:cNvSpPr/>
+          <p:nvPr/>
+        </p:nvSpPr>
+        <p:spPr>
+          <a:xfrm>
+            <a:off x="5029200" y="5133340"/>
+            <a:ext cx="1635760" cy="914400"/>
+          </a:xfrm>
+          <a:prstGeom prst="rect">
+            <a:avLst/>
+          </a:prstGeom>
+        </p:spPr>
+        <p:style>
+          <a:lnRef idx="2">
+            <a:schemeClr val="accent1">
+              <a:shade val="50000"/>
+            </a:schemeClr>
+          </a:lnRef>
+          <a:fillRef idx="1">
+            <a:schemeClr val="accent1"/>
+          </a:fillRef>
+          <a:effectRef idx="0">
+            <a:schemeClr val="accent1"/>
+          </a:effectRef>
+          <a:fontRef idx="minor">
+            <a:schemeClr val="lt1"/>
+          </a:fontRef>
+        </p:style>
+        <p:txBody>
+          <a:bodyPr rtlCol="0" anchor="ctr"/>
+          <a:lstStyle/>
+          <a:p>
+            <a:pPr algn="ctr"/>
+            <a:r>
+              <a:rPr lang="en-US" sz="2000" b="1" dirty="0" smtClean="0"/>
+              <a:t>Learn RF</a:t>
+            </a:r>
+          </a:p>
+        </p:txBody>
+      </p:sp>
+      <p:cxnSp>
+        <p:nvCxnSpPr>
+          <p:cNvPr id="15" name="Straight Arrow Connector 14"/>
+          <p:cNvCxnSpPr>
+            <a:stCxn id="2" idx="3"/>
+            <a:endCxn id="11" idx="1"/>
+          </p:cNvCxnSpPr>
+          <p:nvPr/>
+        </p:nvCxnSpPr>
+        <p:spPr>
+          <a:xfrm>
+            <a:off x="1859280" y="812800"/>
+            <a:ext cx="1930400" cy="0"/>
+          </a:xfrm>
+          <a:prstGeom prst="straightConnector1">
+            <a:avLst/>
+          </a:prstGeom>
+          <a:ln w="38100">
+            <a:tailEnd type="triangle"/>
+          </a:ln>
+        </p:spPr>
+        <p:style>
+          <a:lnRef idx="3">
+            <a:schemeClr val="dk1"/>
+          </a:lnRef>
+          <a:fillRef idx="0">
+            <a:schemeClr val="dk1"/>
+          </a:fillRef>
+          <a:effectRef idx="2">
+            <a:schemeClr val="dk1"/>
+          </a:effectRef>
+          <a:fontRef idx="minor">
+            <a:schemeClr val="tx1"/>
+          </a:fontRef>
+        </p:style>
+      </p:cxnSp>
+      <p:cxnSp>
+        <p:nvCxnSpPr>
+          <p:cNvPr id="19" name="Straight Arrow Connector 18"/>
+          <p:cNvCxnSpPr>
+            <a:stCxn id="11" idx="3"/>
+            <a:endCxn id="3" idx="1"/>
+          </p:cNvCxnSpPr>
+          <p:nvPr/>
+        </p:nvCxnSpPr>
+        <p:spPr>
+          <a:xfrm>
+            <a:off x="5425440" y="812800"/>
+            <a:ext cx="3794760" cy="0"/>
+          </a:xfrm>
+          <a:prstGeom prst="straightConnector1">
+            <a:avLst/>
+          </a:prstGeom>
+          <a:ln w="38100">
+            <a:tailEnd type="triangle"/>
+          </a:ln>
+        </p:spPr>
+        <p:style>
+          <a:lnRef idx="3">
+            <a:schemeClr val="dk1"/>
+          </a:lnRef>
+          <a:fillRef idx="0">
+            <a:schemeClr val="dk1"/>
+          </a:fillRef>
+          <a:effectRef idx="2">
+            <a:schemeClr val="dk1"/>
+          </a:effectRef>
+          <a:fontRef idx="minor">
+            <a:schemeClr val="tx1"/>
+          </a:fontRef>
+        </p:style>
+      </p:cxnSp>
+      <p:cxnSp>
+        <p:nvCxnSpPr>
+          <p:cNvPr id="23" name="Straight Arrow Connector 22"/>
+          <p:cNvCxnSpPr>
+            <a:stCxn id="6" idx="1"/>
+            <a:endCxn id="12" idx="3"/>
+          </p:cNvCxnSpPr>
+          <p:nvPr/>
+        </p:nvCxnSpPr>
+        <p:spPr>
+          <a:xfrm flipH="1">
+            <a:off x="6661150" y="2149293"/>
+            <a:ext cx="1060450" cy="0"/>
+          </a:xfrm>
+          <a:prstGeom prst="straightConnector1">
+            <a:avLst/>
+          </a:prstGeom>
+          <a:ln w="38100">
+            <a:tailEnd type="triangle"/>
+          </a:ln>
+        </p:spPr>
+        <p:style>
+          <a:lnRef idx="3">
+            <a:schemeClr val="dk1"/>
+          </a:lnRef>
+          <a:fillRef idx="0">
+            <a:schemeClr val="dk1"/>
+          </a:fillRef>
+          <a:effectRef idx="2">
+            <a:schemeClr val="dk1"/>
+          </a:effectRef>
+          <a:fontRef idx="minor">
+            <a:schemeClr val="tx1"/>
+          </a:fontRef>
+        </p:style>
+      </p:cxnSp>
+      <p:sp>
+        <p:nvSpPr>
+          <p:cNvPr id="38" name="Rectangle 37"/>
+          <p:cNvSpPr/>
+          <p:nvPr/>
+        </p:nvSpPr>
+        <p:spPr>
+          <a:xfrm>
+            <a:off x="5389880" y="3394710"/>
+            <a:ext cx="914400" cy="914400"/>
+          </a:xfrm>
+          <a:prstGeom prst="rect">
+            <a:avLst/>
+          </a:prstGeom>
+        </p:spPr>
+        <p:style>
+          <a:lnRef idx="2">
+            <a:schemeClr val="accent1">
+              <a:shade val="50000"/>
+            </a:schemeClr>
+          </a:lnRef>
+          <a:fillRef idx="1">
+            <a:schemeClr val="accent1"/>
+          </a:fillRef>
+          <a:effectRef idx="0">
+            <a:schemeClr val="accent1"/>
+          </a:effectRef>
+          <a:fontRef idx="minor">
+            <a:schemeClr val="lt1"/>
+          </a:fontRef>
+        </p:style>
+        <p:txBody>
+          <a:bodyPr rtlCol="0" anchor="ctr"/>
+          <a:lstStyle/>
+          <a:p>
+            <a:pPr algn="ctr"/>
+            <a:r>
+              <a:rPr lang="en-US" sz="2000" b="1" dirty="0" smtClean="0"/>
+              <a:t>EM</a:t>
+            </a:r>
+            <a:endParaRPr lang="en-US" sz="2000" b="1" dirty="0"/>
           </a:p>
         </p:txBody>
       </p:sp>
@@ -6617,25 +8201,25 @@
         </p:nvCxnSpPr>
         <p:spPr>
           <a:xfrm>
-            <a:off x="4607560" y="2651760"/>
-            <a:ext cx="0" cy="509270"/>
+            <a:off x="5843270" y="2606493"/>
+            <a:ext cx="3810" cy="788217"/>
           </a:xfrm>
           <a:prstGeom prst="straightConnector1">
             <a:avLst/>
           </a:prstGeom>
-          <a:ln>
+          <a:ln w="38100">
             <a:tailEnd type="triangle"/>
           </a:ln>
         </p:spPr>
         <p:style>
-          <a:lnRef idx="1">
-            <a:schemeClr val="accent1"/>
+          <a:lnRef idx="3">
+            <a:schemeClr val="dk1"/>
           </a:lnRef>
           <a:fillRef idx="0">
-            <a:schemeClr val="accent1"/>
+            <a:schemeClr val="dk1"/>
           </a:fillRef>
-          <a:effectRef idx="0">
-            <a:schemeClr val="accent1"/>
+          <a:effectRef idx="2">
+            <a:schemeClr val="dk1"/>
           </a:effectRef>
           <a:fontRef idx="minor">
             <a:schemeClr val="tx1"/>
@@ -6653,25 +8237,25 @@
         </p:nvCxnSpPr>
         <p:spPr>
           <a:xfrm>
-            <a:off x="4607560" y="4075430"/>
-            <a:ext cx="0" cy="509270"/>
+            <a:off x="5847080" y="4309110"/>
+            <a:ext cx="0" cy="824230"/>
           </a:xfrm>
           <a:prstGeom prst="straightConnector1">
             <a:avLst/>
           </a:prstGeom>
-          <a:ln>
+          <a:ln w="38100">
             <a:tailEnd type="triangle"/>
           </a:ln>
         </p:spPr>
         <p:style>
-          <a:lnRef idx="1">
-            <a:schemeClr val="accent1"/>
+          <a:lnRef idx="3">
+            <a:schemeClr val="dk1"/>
           </a:lnRef>
           <a:fillRef idx="0">
-            <a:schemeClr val="accent1"/>
+            <a:schemeClr val="dk1"/>
           </a:fillRef>
-          <a:effectRef idx="0">
-            <a:schemeClr val="accent1"/>
+          <a:effectRef idx="2">
+            <a:schemeClr val="dk1"/>
           </a:effectRef>
           <a:fontRef idx="minor">
             <a:schemeClr val="tx1"/>
@@ -6689,25 +8273,25 @@
         </p:nvCxnSpPr>
         <p:spPr>
           <a:xfrm flipH="1">
-            <a:off x="3210560" y="5041900"/>
-            <a:ext cx="579120" cy="0"/>
+            <a:off x="3271520" y="5590540"/>
+            <a:ext cx="1757680" cy="0"/>
           </a:xfrm>
           <a:prstGeom prst="straightConnector1">
             <a:avLst/>
           </a:prstGeom>
-          <a:ln>
+          <a:ln w="38100">
             <a:tailEnd type="triangle"/>
           </a:ln>
         </p:spPr>
         <p:style>
-          <a:lnRef idx="1">
-            <a:schemeClr val="accent1"/>
+          <a:lnRef idx="3">
+            <a:schemeClr val="dk1"/>
           </a:lnRef>
           <a:fillRef idx="0">
-            <a:schemeClr val="accent1"/>
+            <a:schemeClr val="dk1"/>
           </a:fillRef>
-          <a:effectRef idx="0">
-            <a:schemeClr val="accent1"/>
+          <a:effectRef idx="2">
+            <a:schemeClr val="dk1"/>
           </a:effectRef>
           <a:fontRef idx="minor">
             <a:schemeClr val="tx1"/>
@@ -6725,25 +8309,25 @@
         </p:nvCxnSpPr>
         <p:spPr>
           <a:xfrm flipV="1">
-            <a:off x="2499360" y="3161030"/>
-            <a:ext cx="0" cy="1423670"/>
+            <a:off x="2560320" y="3577590"/>
+            <a:ext cx="0" cy="1555750"/>
           </a:xfrm>
           <a:prstGeom prst="straightConnector1">
             <a:avLst/>
           </a:prstGeom>
-          <a:ln>
+          <a:ln w="38100">
             <a:tailEnd type="triangle"/>
           </a:ln>
         </p:spPr>
         <p:style>
-          <a:lnRef idx="1">
-            <a:schemeClr val="accent1"/>
+          <a:lnRef idx="3">
+            <a:schemeClr val="dk1"/>
           </a:lnRef>
           <a:fillRef idx="0">
-            <a:schemeClr val="accent1"/>
+            <a:schemeClr val="dk1"/>
           </a:fillRef>
-          <a:effectRef idx="0">
-            <a:schemeClr val="accent1"/>
+          <a:effectRef idx="2">
+            <a:schemeClr val="dk1"/>
           </a:effectRef>
           <a:fontRef idx="minor">
             <a:schemeClr val="tx1"/>
@@ -6760,25 +8344,27 @@
         </p:nvCxnSpPr>
         <p:spPr>
           <a:xfrm rot="5400000" flipH="1" flipV="1">
-            <a:off x="2569845" y="1026795"/>
-            <a:ext cx="1149350" cy="1290320"/>
-          </a:xfrm>
-          <a:prstGeom prst="bentConnector2">
-            <a:avLst/>
+            <a:off x="2392046" y="1265554"/>
+            <a:ext cx="1565910" cy="1229362"/>
+          </a:xfrm>
+          <a:prstGeom prst="bentConnector3">
+            <a:avLst>
+              <a:gd name="adj1" fmla="val 99959"/>
+            </a:avLst>
           </a:prstGeom>
-          <a:ln>
+          <a:ln w="38100">
             <a:tailEnd type="triangle"/>
           </a:ln>
         </p:spPr>
         <p:style>
-          <a:lnRef idx="1">
-            <a:schemeClr val="accent1"/>
+          <a:lnRef idx="3">
+            <a:schemeClr val="dk1"/>
           </a:lnRef>
           <a:fillRef idx="0">
-            <a:schemeClr val="accent1"/>
+            <a:schemeClr val="dk1"/>
           </a:fillRef>
-          <a:effectRef idx="0">
-            <a:schemeClr val="accent1"/>
+          <a:effectRef idx="2">
+            <a:schemeClr val="dk1"/>
           </a:effectRef>
           <a:fontRef idx="minor">
             <a:schemeClr val="tx1"/>
@@ -6794,20 +8380,20 @@
           <p:nvPr>
             <p:extLst>
               <p:ext uri="{D42A27DB-BD31-4B8C-83A1-F6EECF244321}">
-                <p14:modId xmlns:p14="http://schemas.microsoft.com/office/powerpoint/2010/main" val="727387744"/>
+                <p14:modId xmlns:p14="http://schemas.microsoft.com/office/powerpoint/2010/main" val="3694737940"/>
               </p:ext>
             </p:extLst>
           </p:nvPr>
         </p:nvGraphicFramePr>
         <p:xfrm>
-          <a:off x="4607559" y="2735961"/>
+          <a:off x="5847079" y="2735961"/>
           <a:ext cx="1102361" cy="440945"/>
         </p:xfrm>
         <a:graphic>
           <a:graphicData uri="http://schemas.openxmlformats.org/presentationml/2006/ole">
             <mc:AlternateContent xmlns:mc="http://schemas.openxmlformats.org/markup-compatibility/2006">
               <mc:Choice xmlns:v="urn:schemas-microsoft-com:vml" Requires="v">
-                <p:oleObj spid="_x0000_s1052" name="Equation" r:id="rId3" imgW="507960" imgH="203040" progId="Equation.DSMT4">
+                <p:oleObj spid="_x0000_s6188" name="Equation" r:id="rId3" imgW="507960" imgH="203040" progId="Equation.DSMT4">
                   <p:embed/>
                 </p:oleObj>
               </mc:Choice>
@@ -6828,7 +8414,7 @@
                     </p:blipFill>
                     <p:spPr>
                       <a:xfrm>
-                        <a:off x="4607559" y="2735961"/>
+                        <a:off x="5847079" y="2735961"/>
                         <a:ext cx="1102361" cy="440945"/>
                       </a:xfrm>
                       <a:prstGeom prst="rect">
@@ -6851,20 +8437,20 @@
           <p:nvPr>
             <p:extLst>
               <p:ext uri="{D42A27DB-BD31-4B8C-83A1-F6EECF244321}">
-                <p14:modId xmlns:p14="http://schemas.microsoft.com/office/powerpoint/2010/main" val="3851536429"/>
+                <p14:modId xmlns:p14="http://schemas.microsoft.com/office/powerpoint/2010/main" val="2468093830"/>
               </p:ext>
             </p:extLst>
           </p:nvPr>
         </p:nvGraphicFramePr>
         <p:xfrm>
-          <a:off x="4625975" y="4072846"/>
+          <a:off x="5865495" y="4479246"/>
           <a:ext cx="877570" cy="514438"/>
         </p:xfrm>
         <a:graphic>
           <a:graphicData uri="http://schemas.openxmlformats.org/presentationml/2006/ole">
             <mc:AlternateContent xmlns:mc="http://schemas.openxmlformats.org/markup-compatibility/2006">
               <mc:Choice xmlns:v="urn:schemas-microsoft-com:vml" Requires="v">
-                <p:oleObj spid="_x0000_s1053" name="Equation" r:id="rId5" imgW="368280" imgH="215640" progId="Equation.DSMT4">
+                <p:oleObj spid="_x0000_s6189" name="Equation" r:id="rId5" imgW="368280" imgH="215640" progId="Equation.DSMT4">
                   <p:embed/>
                 </p:oleObj>
               </mc:Choice>
@@ -6885,7 +8471,7 @@
                     </p:blipFill>
                     <p:spPr>
                       <a:xfrm>
-                        <a:off x="4625975" y="4072846"/>
+                        <a:off x="5865495" y="4479246"/>
                         <a:ext cx="877570" cy="514438"/>
                       </a:xfrm>
                       <a:prstGeom prst="rect">
@@ -6921,7 +8507,7 @@
           <a:graphicData uri="http://schemas.openxmlformats.org/presentationml/2006/ole">
             <mc:AlternateContent xmlns:mc="http://schemas.openxmlformats.org/markup-compatibility/2006">
               <mc:Choice xmlns:v="urn:schemas-microsoft-com:vml" Requires="v">
-                <p:oleObj spid="_x0000_s1054" name="Equation" r:id="rId7" imgW="279360" imgH="203040" progId="Equation.DSMT4">
+                <p:oleObj spid="_x0000_s6190" name="Equation" r:id="rId7" imgW="279360" imgH="203040" progId="Equation.DSMT4">
                   <p:embed/>
                 </p:oleObj>
               </mc:Choice>
@@ -7004,7 +8590,7 @@
           <a:graphicData uri="http://schemas.openxmlformats.org/presentationml/2006/ole">
             <mc:AlternateContent xmlns:mc="http://schemas.openxmlformats.org/markup-compatibility/2006">
               <mc:Choice xmlns:v="urn:schemas-microsoft-com:vml" Requires="v">
-                <p:oleObj spid="_x0000_s1055" name="Equation" r:id="rId9" imgW="279360" imgH="203040" progId="Equation.DSMT4">
+                <p:oleObj spid="_x0000_s6191" name="Equation" r:id="rId9" imgW="279360" imgH="203040" progId="Equation.DSMT4">
                   <p:embed/>
                 </p:oleObj>
               </mc:Choice>
@@ -7048,20 +8634,20 @@
           <p:nvPr>
             <p:extLst>
               <p:ext uri="{D42A27DB-BD31-4B8C-83A1-F6EECF244321}">
-                <p14:modId xmlns:p14="http://schemas.microsoft.com/office/powerpoint/2010/main" val="3699132851"/>
+                <p14:modId xmlns:p14="http://schemas.microsoft.com/office/powerpoint/2010/main" val="4203050480"/>
               </p:ext>
             </p:extLst>
           </p:nvPr>
         </p:nvGraphicFramePr>
         <p:xfrm>
-          <a:off x="1344613" y="1554479"/>
+          <a:off x="1243013" y="1615439"/>
           <a:ext cx="1246188" cy="488950"/>
         </p:xfrm>
         <a:graphic>
           <a:graphicData uri="http://schemas.openxmlformats.org/presentationml/2006/ole">
             <mc:AlternateContent xmlns:mc="http://schemas.openxmlformats.org/markup-compatibility/2006">
               <mc:Choice xmlns:v="urn:schemas-microsoft-com:vml" Requires="v">
-                <p:oleObj spid="_x0000_s1056" name="Equation" r:id="rId11" imgW="583920" imgH="228600" progId="Equation.DSMT4">
+                <p:oleObj spid="_x0000_s6192" name="Equation" r:id="rId11" imgW="583920" imgH="228600" progId="Equation.DSMT4">
                   <p:embed/>
                 </p:oleObj>
               </mc:Choice>
@@ -7082,7 +8668,7 @@
                     </p:blipFill>
                     <p:spPr>
                       <a:xfrm>
-                        <a:off x="1344613" y="1554479"/>
+                        <a:off x="1243013" y="1615439"/>
                         <a:ext cx="1246188" cy="488950"/>
                       </a:xfrm>
                       <a:prstGeom prst="rect">
@@ -7112,19 +8698,19 @@
           <a:prstGeom prst="straightConnector1">
             <a:avLst/>
           </a:prstGeom>
-          <a:ln>
+          <a:ln w="38100">
             <a:tailEnd type="triangle"/>
           </a:ln>
         </p:spPr>
         <p:style>
-          <a:lnRef idx="1">
-            <a:schemeClr val="accent1"/>
+          <a:lnRef idx="3">
+            <a:schemeClr val="dk1"/>
           </a:lnRef>
           <a:fillRef idx="0">
-            <a:schemeClr val="accent1"/>
+            <a:schemeClr val="dk1"/>
           </a:fillRef>
-          <a:effectRef idx="0">
-            <a:schemeClr val="accent1"/>
+          <a:effectRef idx="2">
+            <a:schemeClr val="dk1"/>
           </a:effectRef>
           <a:fontRef idx="minor">
             <a:schemeClr val="tx1"/>
@@ -7140,20 +8726,20 @@
           <p:nvPr>
             <p:extLst>
               <p:ext uri="{D42A27DB-BD31-4B8C-83A1-F6EECF244321}">
-                <p14:modId xmlns:p14="http://schemas.microsoft.com/office/powerpoint/2010/main" val="4163700120"/>
+                <p14:modId xmlns:p14="http://schemas.microsoft.com/office/powerpoint/2010/main" val="1963695085"/>
               </p:ext>
             </p:extLst>
           </p:nvPr>
         </p:nvGraphicFramePr>
         <p:xfrm>
-          <a:off x="8851900" y="2735961"/>
+          <a:off x="10759440" y="272831"/>
           <a:ext cx="825500" cy="512380"/>
         </p:xfrm>
         <a:graphic>
           <a:graphicData uri="http://schemas.openxmlformats.org/presentationml/2006/ole">
             <mc:AlternateContent xmlns:mc="http://schemas.openxmlformats.org/markup-compatibility/2006">
               <mc:Choice xmlns:v="urn:schemas-microsoft-com:vml" Requires="v">
-                <p:oleObj spid="_x0000_s1057" name="Equation" r:id="rId13" imgW="368280" imgH="228600" progId="Equation.DSMT4">
+                <p:oleObj spid="_x0000_s6193" name="Equation" r:id="rId13" imgW="368280" imgH="228600" progId="Equation.DSMT4">
                   <p:embed/>
                 </p:oleObj>
               </mc:Choice>
@@ -7174,7 +8760,7 @@
                     </p:blipFill>
                     <p:spPr>
                       <a:xfrm>
-                        <a:off x="8851900" y="2735961"/>
+                        <a:off x="10759440" y="272831"/>
                         <a:ext cx="825500" cy="512380"/>
                       </a:xfrm>
                       <a:prstGeom prst="rect">
@@ -7188,170 +8774,141 @@
           </a:graphicData>
         </a:graphic>
       </p:graphicFrame>
+      <p:cxnSp>
+        <p:nvCxnSpPr>
+          <p:cNvPr id="22" name="Elbow Connector 21"/>
+          <p:cNvCxnSpPr>
+            <a:stCxn id="11" idx="2"/>
+            <a:endCxn id="12" idx="1"/>
+          </p:cNvCxnSpPr>
+          <p:nvPr/>
+        </p:nvCxnSpPr>
+        <p:spPr>
+          <a:xfrm rot="16200000" flipH="1">
+            <a:off x="4376829" y="1500731"/>
+            <a:ext cx="879293" cy="417830"/>
+          </a:xfrm>
+          <a:prstGeom prst="bentConnector2">
+            <a:avLst/>
+          </a:prstGeom>
+          <a:ln w="38100">
+            <a:tailEnd type="triangle"/>
+          </a:ln>
+        </p:spPr>
+        <p:style>
+          <a:lnRef idx="3">
+            <a:schemeClr val="dk1"/>
+          </a:lnRef>
+          <a:fillRef idx="0">
+            <a:schemeClr val="dk1"/>
+          </a:fillRef>
+          <a:effectRef idx="2">
+            <a:schemeClr val="dk1"/>
+          </a:effectRef>
+          <a:fontRef idx="minor">
+            <a:schemeClr val="tx1"/>
+          </a:fontRef>
+        </p:style>
+      </p:cxnSp>
+      <p:graphicFrame>
+        <p:nvGraphicFramePr>
+          <p:cNvPr id="43" name="Object 42"/>
+          <p:cNvGraphicFramePr>
+            <a:graphicFrameLocks noChangeAspect="1"/>
+          </p:cNvGraphicFramePr>
+          <p:nvPr>
+            <p:extLst>
+              <p:ext uri="{D42A27DB-BD31-4B8C-83A1-F6EECF244321}">
+                <p14:modId xmlns:p14="http://schemas.microsoft.com/office/powerpoint/2010/main" val="1731903859"/>
+              </p:ext>
+            </p:extLst>
+          </p:nvPr>
+        </p:nvGraphicFramePr>
+        <p:xfrm>
+          <a:off x="936149" y="4054476"/>
+          <a:ext cx="1490663" cy="488950"/>
+        </p:xfrm>
+        <a:graphic>
+          <a:graphicData uri="http://schemas.openxmlformats.org/presentationml/2006/ole">
+            <mc:AlternateContent xmlns:mc="http://schemas.openxmlformats.org/markup-compatibility/2006">
+              <mc:Choice xmlns:v="urn:schemas-microsoft-com:vml" Requires="v">
+                <p:oleObj spid="_x0000_s6194" name="Equation" r:id="rId15" imgW="698400" imgH="228600" progId="Equation.DSMT4">
+                  <p:embed/>
+                </p:oleObj>
+              </mc:Choice>
+              <mc:Fallback>
+                <p:oleObj name="Equation" r:id="rId15" imgW="698400" imgH="228600" progId="Equation.DSMT4">
+                  <p:embed/>
+                  <p:pic>
+                    <p:nvPicPr>
+                      <p:cNvPr id="0" name=""/>
+                      <p:cNvPicPr/>
+                      <p:nvPr/>
+                    </p:nvPicPr>
+                    <p:blipFill>
+                      <a:blip r:embed="rId16"/>
+                      <a:stretch>
+                        <a:fillRect/>
+                      </a:stretch>
+                    </p:blipFill>
+                    <p:spPr>
+                      <a:xfrm>
+                        <a:off x="936149" y="4054476"/>
+                        <a:ext cx="1490663" cy="488950"/>
+                      </a:xfrm>
+                      <a:prstGeom prst="rect">
+                        <a:avLst/>
+                      </a:prstGeom>
+                    </p:spPr>
+                  </p:pic>
+                </p:oleObj>
+              </mc:Fallback>
+            </mc:AlternateContent>
+          </a:graphicData>
+        </a:graphic>
+      </p:graphicFrame>
+      <p:cxnSp>
+        <p:nvCxnSpPr>
+          <p:cNvPr id="32" name="Elbow Connector 31"/>
+          <p:cNvCxnSpPr>
+            <a:stCxn id="3" idx="2"/>
+            <a:endCxn id="4" idx="2"/>
+          </p:cNvCxnSpPr>
+          <p:nvPr/>
+        </p:nvCxnSpPr>
+        <p:spPr>
+          <a:xfrm rot="5400000">
+            <a:off x="3729990" y="100330"/>
+            <a:ext cx="4777740" cy="7117080"/>
+          </a:xfrm>
+          <a:prstGeom prst="bentConnector3">
+            <a:avLst>
+              <a:gd name="adj1" fmla="val 104785"/>
+            </a:avLst>
+          </a:prstGeom>
+          <a:ln w="38100">
+            <a:tailEnd type="triangle"/>
+          </a:ln>
+        </p:spPr>
+        <p:style>
+          <a:lnRef idx="3">
+            <a:schemeClr val="dk1"/>
+          </a:lnRef>
+          <a:fillRef idx="0">
+            <a:schemeClr val="dk1"/>
+          </a:fillRef>
+          <a:effectRef idx="2">
+            <a:schemeClr val="dk1"/>
+          </a:effectRef>
+          <a:fontRef idx="minor">
+            <a:schemeClr val="tx1"/>
+          </a:fontRef>
+        </p:style>
+      </p:cxnSp>
     </p:spTree>
     <p:extLst>
       <p:ext uri="{BB962C8B-B14F-4D97-AF65-F5344CB8AC3E}">
-        <p14:creationId xmlns:p14="http://schemas.microsoft.com/office/powerpoint/2010/main" val="1254818597"/>
-      </p:ext>
-    </p:extLst>
-  </p:cSld>
-  <p:clrMapOvr>
-    <a:masterClrMapping/>
-  </p:clrMapOvr>
-  <p:timing>
-    <p:tnLst>
-      <p:par>
-        <p:cTn id="1" dur="indefinite" restart="never" nodeType="tmRoot"/>
-      </p:par>
-    </p:tnLst>
-  </p:timing>
-</p:sld>
-</file>
-
-<file path=ppt/slides/slide8.xml><?xml version="1.0" encoding="utf-8"?>
-<p:sld xmlns:a="http://schemas.openxmlformats.org/drawingml/2006/main" xmlns:r="http://schemas.openxmlformats.org/officeDocument/2006/relationships" xmlns:p="http://schemas.openxmlformats.org/presentationml/2006/main">
-  <p:cSld>
-    <p:spTree>
-      <p:nvGrpSpPr>
-        <p:cNvPr id="1" name=""/>
-        <p:cNvGrpSpPr/>
-        <p:nvPr/>
-      </p:nvGrpSpPr>
-      <p:grpSpPr>
-        <a:xfrm>
-          <a:off x="0" y="0"/>
-          <a:ext cx="0" cy="0"/>
-          <a:chOff x="0" y="0"/>
-          <a:chExt cx="0" cy="0"/>
-        </a:xfrm>
-      </p:grpSpPr>
-      <p:sp>
-        <p:nvSpPr>
-          <p:cNvPr id="2" name="Title 1"/>
-          <p:cNvSpPr>
-            <a:spLocks noGrp="1"/>
-          </p:cNvSpPr>
-          <p:nvPr>
-            <p:ph type="title"/>
-          </p:nvPr>
-        </p:nvSpPr>
-        <p:spPr/>
-        <p:txBody>
-          <a:bodyPr/>
-          <a:lstStyle/>
-          <a:p>
-            <a:r>
-              <a:rPr lang="en-US" dirty="0" smtClean="0"/>
-              <a:t>Random Forest</a:t>
-            </a:r>
-            <a:endParaRPr lang="en-US" dirty="0"/>
-          </a:p>
-        </p:txBody>
-      </p:sp>
-      <p:pic>
-        <p:nvPicPr>
-          <p:cNvPr id="4" name="Picture 11"/>
-          <p:cNvPicPr>
-            <a:picLocks noChangeAspect="1" noChangeArrowheads="1"/>
-          </p:cNvPicPr>
-          <p:nvPr/>
-        </p:nvPicPr>
-        <p:blipFill>
-          <a:blip r:embed="rId2">
-            <a:extLst>
-              <a:ext uri="{28A0092B-C50C-407E-A947-70E740481C1C}">
-                <a14:useLocalDpi xmlns:a14="http://schemas.microsoft.com/office/drawing/2010/main" val="0"/>
-              </a:ext>
-            </a:extLst>
-          </a:blip>
-          <a:stretch>
-            <a:fillRect/>
-          </a:stretch>
-        </p:blipFill>
-        <p:spPr bwMode="auto">
-          <a:xfrm>
-            <a:off x="1069423" y="1493519"/>
-            <a:ext cx="9738194" cy="4942225"/>
-          </a:xfrm>
-          <a:prstGeom prst="rect">
-            <a:avLst/>
-          </a:prstGeom>
-          <a:noFill/>
-          <a:extLst>
-            <a:ext uri="{909E8E84-426E-40DD-AFC4-6F175D3DCCD1}">
-              <a14:hiddenFill xmlns:a14="http://schemas.microsoft.com/office/drawing/2010/main">
-                <a:solidFill>
-                  <a:srgbClr val="FFFFFF"/>
-                </a:solidFill>
-              </a14:hiddenFill>
-            </a:ext>
-          </a:extLst>
-        </p:spPr>
-      </p:pic>
-      <p:sp>
-        <p:nvSpPr>
-          <p:cNvPr id="5" name="TextBox 4"/>
-          <p:cNvSpPr txBox="1"/>
-          <p:nvPr/>
-        </p:nvSpPr>
-        <p:spPr>
-          <a:xfrm>
-            <a:off x="731520" y="1798320"/>
-            <a:ext cx="894080" cy="369332"/>
-          </a:xfrm>
-          <a:prstGeom prst="rect">
-            <a:avLst/>
-          </a:prstGeom>
-          <a:noFill/>
-        </p:spPr>
-        <p:txBody>
-          <a:bodyPr wrap="square" rtlCol="0">
-            <a:spAutoFit/>
-          </a:bodyPr>
-          <a:lstStyle/>
-          <a:p>
-            <a:r>
-              <a:rPr lang="en-US" dirty="0" smtClean="0"/>
-              <a:t>Tree 1</a:t>
-            </a:r>
-            <a:endParaRPr lang="en-US" dirty="0"/>
-          </a:p>
-        </p:txBody>
-      </p:sp>
-      <p:sp>
-        <p:nvSpPr>
-          <p:cNvPr id="6" name="TextBox 5"/>
-          <p:cNvSpPr txBox="1"/>
-          <p:nvPr/>
-        </p:nvSpPr>
-        <p:spPr>
-          <a:xfrm>
-            <a:off x="10591800" y="1798320"/>
-            <a:ext cx="894080" cy="369332"/>
-          </a:xfrm>
-          <a:prstGeom prst="rect">
-            <a:avLst/>
-          </a:prstGeom>
-          <a:noFill/>
-        </p:spPr>
-        <p:txBody>
-          <a:bodyPr wrap="square" rtlCol="0">
-            <a:spAutoFit/>
-          </a:bodyPr>
-          <a:lstStyle/>
-          <a:p>
-            <a:r>
-              <a:rPr lang="en-US" dirty="0" smtClean="0"/>
-              <a:t>Tree n</a:t>
-            </a:r>
-            <a:endParaRPr lang="en-US" dirty="0"/>
-          </a:p>
-        </p:txBody>
-      </p:sp>
-    </p:spTree>
-    <p:extLst>
-      <p:ext uri="{BB962C8B-B14F-4D97-AF65-F5344CB8AC3E}">
-        <p14:creationId xmlns:p14="http://schemas.microsoft.com/office/powerpoint/2010/main" val="3597422835"/>
+        <p14:creationId xmlns:p14="http://schemas.microsoft.com/office/powerpoint/2010/main" val="4248269664"/>
       </p:ext>
     </p:extLst>
   </p:cSld>

</xml_diff>